<commit_message>
add data model to presentation
</commit_message>
<xml_diff>
--- a/presentation/presentation.pptx
+++ b/presentation/presentation.pptx
@@ -5,7 +5,7 @@
     <p:sldMasterId id="2147483648" r:id="rId1"/>
   </p:sldMasterIdLst>
   <p:notesMasterIdLst>
-    <p:notesMasterId r:id="rId13"/>
+    <p:notesMasterId r:id="rId14"/>
   </p:notesMasterIdLst>
   <p:sldIdLst>
     <p:sldId id="256" r:id="rId2"/>
@@ -14,51 +14,52 @@
     <p:sldId id="270" r:id="rId5"/>
     <p:sldId id="271" r:id="rId6"/>
     <p:sldId id="272" r:id="rId7"/>
-    <p:sldId id="273" r:id="rId8"/>
-    <p:sldId id="279" r:id="rId9"/>
-    <p:sldId id="274" r:id="rId10"/>
-    <p:sldId id="263" r:id="rId11"/>
-    <p:sldId id="278" r:id="rId12"/>
+    <p:sldId id="281" r:id="rId8"/>
+    <p:sldId id="273" r:id="rId9"/>
+    <p:sldId id="279" r:id="rId10"/>
+    <p:sldId id="274" r:id="rId11"/>
+    <p:sldId id="263" r:id="rId12"/>
+    <p:sldId id="278" r:id="rId13"/>
   </p:sldIdLst>
   <p:sldSz cx="18288000" cy="10287000"/>
   <p:notesSz cx="6858000" cy="9144000"/>
   <p:embeddedFontLst>
     <p:embeddedFont>
       <p:font typeface="Calibri" panose="020F0502020204030204" pitchFamily="34" charset="0"/>
-      <p:regular r:id="rId14"/>
-      <p:bold r:id="rId15"/>
-      <p:italic r:id="rId16"/>
-      <p:boldItalic r:id="rId17"/>
+      <p:regular r:id="rId15"/>
+      <p:bold r:id="rId16"/>
+      <p:italic r:id="rId17"/>
+      <p:boldItalic r:id="rId18"/>
     </p:embeddedFont>
     <p:embeddedFont>
       <p:font typeface="Nunito Sans Heavy" panose="020B0604020202020204" charset="0"/>
-      <p:regular r:id="rId18"/>
+      <p:regular r:id="rId19"/>
     </p:embeddedFont>
     <p:embeddedFont>
       <p:font typeface="Nunito Sans Semi-Bold" panose="020B0604020202020204" charset="0"/>
-      <p:regular r:id="rId19"/>
+      <p:regular r:id="rId20"/>
     </p:embeddedFont>
     <p:embeddedFont>
       <p:font typeface="Roboto" panose="02000000000000000000" pitchFamily="2" charset="0"/>
-      <p:regular r:id="rId20"/>
-      <p:bold r:id="rId21"/>
-      <p:italic r:id="rId22"/>
-      <p:boldItalic r:id="rId23"/>
+      <p:regular r:id="rId21"/>
+      <p:bold r:id="rId22"/>
+      <p:italic r:id="rId23"/>
+      <p:boldItalic r:id="rId24"/>
     </p:embeddedFont>
     <p:embeddedFont>
       <p:font typeface="Roboto Light" panose="02000000000000000000" pitchFamily="2" charset="0"/>
-      <p:regular r:id="rId24"/>
-      <p:italic r:id="rId25"/>
+      <p:regular r:id="rId25"/>
+      <p:italic r:id="rId26"/>
     </p:embeddedFont>
     <p:embeddedFont>
       <p:font typeface="Roboto Medium" panose="02000000000000000000" pitchFamily="2" charset="0"/>
-      <p:regular r:id="rId26"/>
-      <p:italic r:id="rId27"/>
+      <p:regular r:id="rId27"/>
+      <p:italic r:id="rId28"/>
     </p:embeddedFont>
     <p:embeddedFont>
       <p:font typeface="Roboto Thin" panose="02000000000000000000" pitchFamily="2" charset="0"/>
-      <p:regular r:id="rId28"/>
-      <p:italic r:id="rId29"/>
+      <p:regular r:id="rId29"/>
+      <p:italic r:id="rId30"/>
     </p:embeddedFont>
   </p:embeddedFontLst>
   <p:defaultTextStyle>
@@ -3347,7 +3348,7 @@
           <a:p>
             <a:fld id="{AAFE12A5-599A-43DF-9C28-A989FC92BB17}" type="slidenum">
               <a:rPr lang="hu-HU" smtClean="0"/>
-              <a:t>11</a:t>
+              <a:t>12</a:t>
             </a:fld>
             <a:endParaRPr lang="hu-HU"/>
           </a:p>
@@ -7108,6 +7109,809 @@
         </p:nvGrpSpPr>
         <p:grpSpPr>
           <a:xfrm>
+            <a:off x="-152400" y="-987552"/>
+            <a:ext cx="18288000" cy="12262103"/>
+            <a:chOff x="0" y="0"/>
+            <a:chExt cx="24384000" cy="16349470"/>
+          </a:xfrm>
+        </p:grpSpPr>
+        <p:sp>
+          <p:nvSpPr>
+            <p:cNvPr id="3" name="Freeform 3"/>
+            <p:cNvSpPr/>
+            <p:nvPr/>
+          </p:nvSpPr>
+          <p:spPr>
+            <a:xfrm>
+              <a:off x="0" y="0"/>
+              <a:ext cx="8198458" cy="8198458"/>
+            </a:xfrm>
+            <a:custGeom>
+              <a:avLst/>
+              <a:gdLst/>
+              <a:ahLst/>
+              <a:cxnLst/>
+              <a:rect l="l" t="t" r="r" b="b"/>
+              <a:pathLst>
+                <a:path w="8198458" h="8198458">
+                  <a:moveTo>
+                    <a:pt x="0" y="0"/>
+                  </a:moveTo>
+                  <a:lnTo>
+                    <a:pt x="8198458" y="0"/>
+                  </a:lnTo>
+                  <a:lnTo>
+                    <a:pt x="8198458" y="8198458"/>
+                  </a:lnTo>
+                  <a:lnTo>
+                    <a:pt x="0" y="8198458"/>
+                  </a:lnTo>
+                  <a:lnTo>
+                    <a:pt x="0" y="0"/>
+                  </a:lnTo>
+                  <a:close/>
+                </a:path>
+              </a:pathLst>
+            </a:custGeom>
+            <a:blipFill>
+              <a:blip r:embed="rId2">
+                <a:alphaModFix amt="50000"/>
+                <a:extLst>
+                  <a:ext uri="{96DAC541-7B7A-43D3-8B79-37D633B846F1}">
+                    <asvg:svgBlip xmlns:asvg="http://schemas.microsoft.com/office/drawing/2016/SVG/main" r:embed="rId3"/>
+                  </a:ext>
+                </a:extLst>
+              </a:blip>
+              <a:stretch>
+                <a:fillRect/>
+              </a:stretch>
+            </a:blipFill>
+          </p:spPr>
+        </p:sp>
+        <p:sp>
+          <p:nvSpPr>
+            <p:cNvPr id="4" name="Freeform 4"/>
+            <p:cNvSpPr/>
+            <p:nvPr/>
+          </p:nvSpPr>
+          <p:spPr>
+            <a:xfrm>
+              <a:off x="0" y="8103568"/>
+              <a:ext cx="8198458" cy="8198458"/>
+            </a:xfrm>
+            <a:custGeom>
+              <a:avLst/>
+              <a:gdLst/>
+              <a:ahLst/>
+              <a:cxnLst/>
+              <a:rect l="l" t="t" r="r" b="b"/>
+              <a:pathLst>
+                <a:path w="8198458" h="8198458">
+                  <a:moveTo>
+                    <a:pt x="0" y="0"/>
+                  </a:moveTo>
+                  <a:lnTo>
+                    <a:pt x="8198458" y="0"/>
+                  </a:lnTo>
+                  <a:lnTo>
+                    <a:pt x="8198458" y="8198458"/>
+                  </a:lnTo>
+                  <a:lnTo>
+                    <a:pt x="0" y="8198458"/>
+                  </a:lnTo>
+                  <a:lnTo>
+                    <a:pt x="0" y="0"/>
+                  </a:lnTo>
+                  <a:close/>
+                </a:path>
+              </a:pathLst>
+            </a:custGeom>
+            <a:blipFill>
+              <a:blip r:embed="rId2">
+                <a:alphaModFix amt="50000"/>
+                <a:extLst>
+                  <a:ext uri="{96DAC541-7B7A-43D3-8B79-37D633B846F1}">
+                    <asvg:svgBlip xmlns:asvg="http://schemas.microsoft.com/office/drawing/2016/SVG/main" r:embed="rId3"/>
+                  </a:ext>
+                </a:extLst>
+              </a:blip>
+              <a:stretch>
+                <a:fillRect/>
+              </a:stretch>
+            </a:blipFill>
+          </p:spPr>
+        </p:sp>
+        <p:sp>
+          <p:nvSpPr>
+            <p:cNvPr id="5" name="Freeform 5"/>
+            <p:cNvSpPr/>
+            <p:nvPr/>
+          </p:nvSpPr>
+          <p:spPr>
+            <a:xfrm>
+              <a:off x="8107869" y="0"/>
+              <a:ext cx="8198458" cy="8198458"/>
+            </a:xfrm>
+            <a:custGeom>
+              <a:avLst/>
+              <a:gdLst/>
+              <a:ahLst/>
+              <a:cxnLst/>
+              <a:rect l="l" t="t" r="r" b="b"/>
+              <a:pathLst>
+                <a:path w="8198458" h="8198458">
+                  <a:moveTo>
+                    <a:pt x="0" y="0"/>
+                  </a:moveTo>
+                  <a:lnTo>
+                    <a:pt x="8198458" y="0"/>
+                  </a:lnTo>
+                  <a:lnTo>
+                    <a:pt x="8198458" y="8198458"/>
+                  </a:lnTo>
+                  <a:lnTo>
+                    <a:pt x="0" y="8198458"/>
+                  </a:lnTo>
+                  <a:lnTo>
+                    <a:pt x="0" y="0"/>
+                  </a:lnTo>
+                  <a:close/>
+                </a:path>
+              </a:pathLst>
+            </a:custGeom>
+            <a:blipFill>
+              <a:blip r:embed="rId2">
+                <a:alphaModFix amt="50000"/>
+                <a:extLst>
+                  <a:ext uri="{96DAC541-7B7A-43D3-8B79-37D633B846F1}">
+                    <asvg:svgBlip xmlns:asvg="http://schemas.microsoft.com/office/drawing/2016/SVG/main" r:embed="rId3"/>
+                  </a:ext>
+                </a:extLst>
+              </a:blip>
+              <a:stretch>
+                <a:fillRect/>
+              </a:stretch>
+            </a:blipFill>
+          </p:spPr>
+        </p:sp>
+        <p:sp>
+          <p:nvSpPr>
+            <p:cNvPr id="6" name="Freeform 6"/>
+            <p:cNvSpPr/>
+            <p:nvPr/>
+          </p:nvSpPr>
+          <p:spPr>
+            <a:xfrm>
+              <a:off x="8107869" y="8103568"/>
+              <a:ext cx="8198458" cy="8198458"/>
+            </a:xfrm>
+            <a:custGeom>
+              <a:avLst/>
+              <a:gdLst/>
+              <a:ahLst/>
+              <a:cxnLst/>
+              <a:rect l="l" t="t" r="r" b="b"/>
+              <a:pathLst>
+                <a:path w="8198458" h="8198458">
+                  <a:moveTo>
+                    <a:pt x="0" y="0"/>
+                  </a:moveTo>
+                  <a:lnTo>
+                    <a:pt x="8198458" y="0"/>
+                  </a:lnTo>
+                  <a:lnTo>
+                    <a:pt x="8198458" y="8198458"/>
+                  </a:lnTo>
+                  <a:lnTo>
+                    <a:pt x="0" y="8198458"/>
+                  </a:lnTo>
+                  <a:lnTo>
+                    <a:pt x="0" y="0"/>
+                  </a:lnTo>
+                  <a:close/>
+                </a:path>
+              </a:pathLst>
+            </a:custGeom>
+            <a:blipFill>
+              <a:blip r:embed="rId2">
+                <a:alphaModFix amt="50000"/>
+                <a:extLst>
+                  <a:ext uri="{96DAC541-7B7A-43D3-8B79-37D633B846F1}">
+                    <asvg:svgBlip xmlns:asvg="http://schemas.microsoft.com/office/drawing/2016/SVG/main" r:embed="rId3"/>
+                  </a:ext>
+                </a:extLst>
+              </a:blip>
+              <a:stretch>
+                <a:fillRect/>
+              </a:stretch>
+            </a:blipFill>
+          </p:spPr>
+        </p:sp>
+        <p:sp>
+          <p:nvSpPr>
+            <p:cNvPr id="7" name="Freeform 7"/>
+            <p:cNvSpPr/>
+            <p:nvPr/>
+          </p:nvSpPr>
+          <p:spPr>
+            <a:xfrm>
+              <a:off x="16185542" y="47445"/>
+              <a:ext cx="8198458" cy="8198458"/>
+            </a:xfrm>
+            <a:custGeom>
+              <a:avLst/>
+              <a:gdLst/>
+              <a:ahLst/>
+              <a:cxnLst/>
+              <a:rect l="l" t="t" r="r" b="b"/>
+              <a:pathLst>
+                <a:path w="8198458" h="8198458">
+                  <a:moveTo>
+                    <a:pt x="0" y="0"/>
+                  </a:moveTo>
+                  <a:lnTo>
+                    <a:pt x="8198458" y="0"/>
+                  </a:lnTo>
+                  <a:lnTo>
+                    <a:pt x="8198458" y="8198457"/>
+                  </a:lnTo>
+                  <a:lnTo>
+                    <a:pt x="0" y="8198457"/>
+                  </a:lnTo>
+                  <a:lnTo>
+                    <a:pt x="0" y="0"/>
+                  </a:lnTo>
+                  <a:close/>
+                </a:path>
+              </a:pathLst>
+            </a:custGeom>
+            <a:blipFill>
+              <a:blip r:embed="rId2">
+                <a:alphaModFix amt="50000"/>
+                <a:extLst>
+                  <a:ext uri="{96DAC541-7B7A-43D3-8B79-37D633B846F1}">
+                    <asvg:svgBlip xmlns:asvg="http://schemas.microsoft.com/office/drawing/2016/SVG/main" r:embed="rId3"/>
+                  </a:ext>
+                </a:extLst>
+              </a:blip>
+              <a:stretch>
+                <a:fillRect/>
+              </a:stretch>
+            </a:blipFill>
+          </p:spPr>
+        </p:sp>
+        <p:sp>
+          <p:nvSpPr>
+            <p:cNvPr id="8" name="Freeform 8"/>
+            <p:cNvSpPr/>
+            <p:nvPr/>
+          </p:nvSpPr>
+          <p:spPr>
+            <a:xfrm>
+              <a:off x="16185542" y="8151013"/>
+              <a:ext cx="8198458" cy="8198458"/>
+            </a:xfrm>
+            <a:custGeom>
+              <a:avLst/>
+              <a:gdLst/>
+              <a:ahLst/>
+              <a:cxnLst/>
+              <a:rect l="l" t="t" r="r" b="b"/>
+              <a:pathLst>
+                <a:path w="8198458" h="8198458">
+                  <a:moveTo>
+                    <a:pt x="0" y="0"/>
+                  </a:moveTo>
+                  <a:lnTo>
+                    <a:pt x="8198458" y="0"/>
+                  </a:lnTo>
+                  <a:lnTo>
+                    <a:pt x="8198458" y="8198457"/>
+                  </a:lnTo>
+                  <a:lnTo>
+                    <a:pt x="0" y="8198457"/>
+                  </a:lnTo>
+                  <a:lnTo>
+                    <a:pt x="0" y="0"/>
+                  </a:lnTo>
+                  <a:close/>
+                </a:path>
+              </a:pathLst>
+            </a:custGeom>
+            <a:blipFill>
+              <a:blip r:embed="rId2">
+                <a:alphaModFix amt="50000"/>
+                <a:extLst>
+                  <a:ext uri="{96DAC541-7B7A-43D3-8B79-37D633B846F1}">
+                    <asvg:svgBlip xmlns:asvg="http://schemas.microsoft.com/office/drawing/2016/SVG/main" r:embed="rId3"/>
+                  </a:ext>
+                </a:extLst>
+              </a:blip>
+              <a:stretch>
+                <a:fillRect/>
+              </a:stretch>
+            </a:blipFill>
+          </p:spPr>
+        </p:sp>
+      </p:grpSp>
+      <p:grpSp>
+        <p:nvGrpSpPr>
+          <p:cNvPr id="9" name="Group 9"/>
+          <p:cNvGrpSpPr/>
+          <p:nvPr/>
+        </p:nvGrpSpPr>
+        <p:grpSpPr>
+          <a:xfrm>
+            <a:off x="-2038330" y="-2073710"/>
+            <a:ext cx="5041299" cy="5041299"/>
+            <a:chOff x="0" y="0"/>
+            <a:chExt cx="812800" cy="812800"/>
+          </a:xfrm>
+        </p:grpSpPr>
+        <p:sp>
+          <p:nvSpPr>
+            <p:cNvPr id="10" name="Freeform 10"/>
+            <p:cNvSpPr/>
+            <p:nvPr/>
+          </p:nvSpPr>
+          <p:spPr>
+            <a:xfrm>
+              <a:off x="0" y="0"/>
+              <a:ext cx="812800" cy="812800"/>
+            </a:xfrm>
+            <a:custGeom>
+              <a:avLst/>
+              <a:gdLst/>
+              <a:ahLst/>
+              <a:cxnLst/>
+              <a:rect l="l" t="t" r="r" b="b"/>
+              <a:pathLst>
+                <a:path w="812800" h="812800">
+                  <a:moveTo>
+                    <a:pt x="406400" y="0"/>
+                  </a:moveTo>
+                  <a:cubicBezTo>
+                    <a:pt x="181951" y="0"/>
+                    <a:pt x="0" y="181951"/>
+                    <a:pt x="0" y="406400"/>
+                  </a:cubicBezTo>
+                  <a:cubicBezTo>
+                    <a:pt x="0" y="630849"/>
+                    <a:pt x="181951" y="812800"/>
+                    <a:pt x="406400" y="812800"/>
+                  </a:cubicBezTo>
+                  <a:cubicBezTo>
+                    <a:pt x="630849" y="812800"/>
+                    <a:pt x="812800" y="630849"/>
+                    <a:pt x="812800" y="406400"/>
+                  </a:cubicBezTo>
+                  <a:cubicBezTo>
+                    <a:pt x="812800" y="181951"/>
+                    <a:pt x="630849" y="0"/>
+                    <a:pt x="406400" y="0"/>
+                  </a:cubicBezTo>
+                  <a:close/>
+                </a:path>
+              </a:pathLst>
+            </a:custGeom>
+            <a:solidFill>
+              <a:srgbClr val="004AAD"/>
+            </a:solidFill>
+            <a:ln cap="sq">
+              <a:noFill/>
+              <a:prstDash val="solid"/>
+              <a:miter/>
+            </a:ln>
+          </p:spPr>
+        </p:sp>
+        <p:sp>
+          <p:nvSpPr>
+            <p:cNvPr id="11" name="TextBox 11"/>
+            <p:cNvSpPr txBox="1"/>
+            <p:nvPr/>
+          </p:nvSpPr>
+          <p:spPr>
+            <a:xfrm>
+              <a:off x="76200" y="38100"/>
+              <a:ext cx="660400" cy="698500"/>
+            </a:xfrm>
+            <a:prstGeom prst="rect">
+              <a:avLst/>
+            </a:prstGeom>
+          </p:spPr>
+          <p:txBody>
+            <a:bodyPr lIns="50800" tIns="50800" rIns="50800" bIns="50800" rtlCol="0" anchor="ctr"/>
+            <a:lstStyle/>
+            <a:p>
+              <a:pPr algn="ctr">
+                <a:lnSpc>
+                  <a:spcPts val="2800"/>
+                </a:lnSpc>
+              </a:pPr>
+              <a:endParaRPr/>
+            </a:p>
+          </p:txBody>
+        </p:sp>
+      </p:grpSp>
+      <p:sp>
+        <p:nvSpPr>
+          <p:cNvPr id="12" name="TextBox 12"/>
+          <p:cNvSpPr txBox="1"/>
+          <p:nvPr/>
+        </p:nvSpPr>
+        <p:spPr>
+          <a:xfrm>
+            <a:off x="411934" y="502681"/>
+            <a:ext cx="1939447" cy="1377949"/>
+          </a:xfrm>
+          <a:prstGeom prst="rect">
+            <a:avLst/>
+          </a:prstGeom>
+        </p:spPr>
+        <p:txBody>
+          <a:bodyPr lIns="0" tIns="0" rIns="0" bIns="0" rtlCol="0" anchor="t">
+            <a:spAutoFit/>
+          </a:bodyPr>
+          <a:lstStyle/>
+          <a:p>
+            <a:pPr algn="ctr">
+              <a:lnSpc>
+                <a:spcPts val="11200"/>
+              </a:lnSpc>
+            </a:pPr>
+            <a:r>
+              <a:rPr lang="en-US" sz="8000" dirty="0">
+                <a:solidFill>
+                  <a:srgbClr val="FFFFFF"/>
+                </a:solidFill>
+                <a:latin typeface="Nunito Sans Heavy"/>
+              </a:rPr>
+              <a:t>9</a:t>
+            </a:r>
+          </a:p>
+        </p:txBody>
+      </p:sp>
+      <p:sp>
+        <p:nvSpPr>
+          <p:cNvPr id="13" name="TextBox 13"/>
+          <p:cNvSpPr txBox="1"/>
+          <p:nvPr/>
+        </p:nvSpPr>
+        <p:spPr>
+          <a:xfrm>
+            <a:off x="2329129" y="502681"/>
+            <a:ext cx="13629742" cy="1333635"/>
+          </a:xfrm>
+          <a:prstGeom prst="rect">
+            <a:avLst/>
+          </a:prstGeom>
+        </p:spPr>
+        <p:txBody>
+          <a:bodyPr wrap="square" lIns="0" tIns="0" rIns="0" bIns="0" rtlCol="0" anchor="t">
+            <a:spAutoFit/>
+          </a:bodyPr>
+          <a:lstStyle/>
+          <a:p>
+            <a:pPr algn="ctr">
+              <a:lnSpc>
+                <a:spcPts val="11200"/>
+              </a:lnSpc>
+            </a:pPr>
+            <a:r>
+              <a:rPr lang="en-US" sz="8000" dirty="0" err="1">
+                <a:solidFill>
+                  <a:srgbClr val="004AAD"/>
+                </a:solidFill>
+                <a:latin typeface="Roboto Medium" panose="02000000000000000000" pitchFamily="2" charset="0"/>
+                <a:ea typeface="Roboto Medium" panose="02000000000000000000" pitchFamily="2" charset="0"/>
+              </a:rPr>
+              <a:t>Helyesség</a:t>
+            </a:r>
+            <a:r>
+              <a:rPr lang="en-US" sz="8000" dirty="0">
+                <a:solidFill>
+                  <a:srgbClr val="004AAD"/>
+                </a:solidFill>
+                <a:latin typeface="Roboto Medium" panose="02000000000000000000" pitchFamily="2" charset="0"/>
+                <a:ea typeface="Roboto Medium" panose="02000000000000000000" pitchFamily="2" charset="0"/>
+              </a:rPr>
+              <a:t> </a:t>
+            </a:r>
+            <a:r>
+              <a:rPr lang="en-US" sz="8000" dirty="0" err="1">
+                <a:solidFill>
+                  <a:srgbClr val="004AAD"/>
+                </a:solidFill>
+                <a:latin typeface="Roboto Medium" panose="02000000000000000000" pitchFamily="2" charset="0"/>
+                <a:ea typeface="Roboto Medium" panose="02000000000000000000" pitchFamily="2" charset="0"/>
+              </a:rPr>
+              <a:t>vizsgálata</a:t>
+            </a:r>
+            <a:endParaRPr lang="en-US" sz="8000" dirty="0">
+              <a:solidFill>
+                <a:srgbClr val="004AAD"/>
+              </a:solidFill>
+              <a:latin typeface="Roboto Medium" panose="02000000000000000000" pitchFamily="2" charset="0"/>
+              <a:ea typeface="Roboto Medium" panose="02000000000000000000" pitchFamily="2" charset="0"/>
+            </a:endParaRPr>
+          </a:p>
+        </p:txBody>
+      </p:sp>
+      <p:sp>
+        <p:nvSpPr>
+          <p:cNvPr id="14" name="TextBox 14"/>
+          <p:cNvSpPr txBox="1"/>
+          <p:nvPr/>
+        </p:nvSpPr>
+        <p:spPr>
+          <a:xfrm>
+            <a:off x="1381659" y="3974086"/>
+            <a:ext cx="7076542" cy="2821285"/>
+          </a:xfrm>
+          <a:prstGeom prst="rect">
+            <a:avLst/>
+          </a:prstGeom>
+        </p:spPr>
+        <p:txBody>
+          <a:bodyPr wrap="square" lIns="0" tIns="0" rIns="0" bIns="0" rtlCol="0" anchor="t">
+            <a:spAutoFit/>
+          </a:bodyPr>
+          <a:lstStyle/>
+          <a:p>
+            <a:pPr>
+              <a:lnSpc>
+                <a:spcPts val="5599"/>
+              </a:lnSpc>
+            </a:pPr>
+            <a:r>
+              <a:rPr lang="hu-HU" sz="3999" dirty="0">
+                <a:solidFill>
+                  <a:srgbClr val="000000"/>
+                </a:solidFill>
+                <a:latin typeface="Roboto Light" panose="02000000000000000000" pitchFamily="2" charset="0"/>
+                <a:ea typeface="Roboto Light" panose="02000000000000000000" pitchFamily="2" charset="0"/>
+              </a:rPr>
+              <a:t>3 db </a:t>
+            </a:r>
+            <a:r>
+              <a:rPr lang="en-US" sz="3999" dirty="0" err="1">
+                <a:solidFill>
+                  <a:srgbClr val="000000"/>
+                </a:solidFill>
+                <a:latin typeface="Roboto Light" panose="02000000000000000000" pitchFamily="2" charset="0"/>
+                <a:ea typeface="Roboto Light" panose="02000000000000000000" pitchFamily="2" charset="0"/>
+              </a:rPr>
+              <a:t>RefactorErl</a:t>
+            </a:r>
+            <a:r>
+              <a:rPr lang="hu-HU" sz="3999" dirty="0">
+                <a:solidFill>
+                  <a:srgbClr val="000000"/>
+                </a:solidFill>
+                <a:latin typeface="Roboto Light" panose="02000000000000000000" pitchFamily="2" charset="0"/>
+                <a:ea typeface="Roboto Light" panose="02000000000000000000" pitchFamily="2" charset="0"/>
+              </a:rPr>
+              <a:t> példány:</a:t>
+            </a:r>
+          </a:p>
+          <a:p>
+            <a:pPr marL="1028700" lvl="1" indent="-571500">
+              <a:lnSpc>
+                <a:spcPts val="5599"/>
+              </a:lnSpc>
+              <a:buFont typeface="Arial" panose="020B0604020202020204" pitchFamily="34" charset="0"/>
+              <a:buChar char="•"/>
+            </a:pPr>
+            <a:r>
+              <a:rPr lang="hu-HU" sz="3999" dirty="0" err="1">
+                <a:solidFill>
+                  <a:srgbClr val="000000"/>
+                </a:solidFill>
+                <a:latin typeface="Roboto Light" panose="02000000000000000000" pitchFamily="2" charset="0"/>
+                <a:ea typeface="Roboto Light" panose="02000000000000000000" pitchFamily="2" charset="0"/>
+              </a:rPr>
+              <a:t>Mnesia</a:t>
+            </a:r>
+            <a:r>
+              <a:rPr lang="en-US" sz="3999" dirty="0">
+                <a:solidFill>
+                  <a:srgbClr val="000000"/>
+                </a:solidFill>
+                <a:latin typeface="Roboto Light" panose="02000000000000000000" pitchFamily="2" charset="0"/>
+                <a:ea typeface="Roboto Light" panose="02000000000000000000" pitchFamily="2" charset="0"/>
+              </a:rPr>
+              <a:t> DB</a:t>
+            </a:r>
+            <a:endParaRPr lang="hu-HU" sz="3999" dirty="0">
+              <a:solidFill>
+                <a:srgbClr val="000000"/>
+              </a:solidFill>
+              <a:latin typeface="Roboto Light" panose="02000000000000000000" pitchFamily="2" charset="0"/>
+              <a:ea typeface="Roboto Light" panose="02000000000000000000" pitchFamily="2" charset="0"/>
+            </a:endParaRPr>
+          </a:p>
+          <a:p>
+            <a:pPr marL="1028700" lvl="1" indent="-571500">
+              <a:lnSpc>
+                <a:spcPts val="5599"/>
+              </a:lnSpc>
+              <a:buFont typeface="Arial" panose="020B0604020202020204" pitchFamily="34" charset="0"/>
+              <a:buChar char="•"/>
+            </a:pPr>
+            <a:r>
+              <a:rPr lang="hu-HU" sz="3999" dirty="0">
+                <a:solidFill>
+                  <a:srgbClr val="000000"/>
+                </a:solidFill>
+                <a:latin typeface="Roboto Light" panose="02000000000000000000" pitchFamily="2" charset="0"/>
+                <a:ea typeface="Roboto Light" panose="02000000000000000000" pitchFamily="2" charset="0"/>
+              </a:rPr>
+              <a:t>Map</a:t>
+            </a:r>
+            <a:r>
+              <a:rPr lang="en-US" sz="3999" dirty="0">
+                <a:solidFill>
+                  <a:srgbClr val="000000"/>
+                </a:solidFill>
+                <a:latin typeface="Roboto Light" panose="02000000000000000000" pitchFamily="2" charset="0"/>
+                <a:ea typeface="Roboto Light" panose="02000000000000000000" pitchFamily="2" charset="0"/>
+              </a:rPr>
+              <a:t> DB</a:t>
+            </a:r>
+            <a:endParaRPr lang="hu-HU" sz="3999" dirty="0">
+              <a:solidFill>
+                <a:srgbClr val="000000"/>
+              </a:solidFill>
+              <a:latin typeface="Roboto Light" panose="02000000000000000000" pitchFamily="2" charset="0"/>
+              <a:ea typeface="Roboto Light" panose="02000000000000000000" pitchFamily="2" charset="0"/>
+            </a:endParaRPr>
+          </a:p>
+          <a:p>
+            <a:pPr marL="1028700" lvl="1" indent="-571500">
+              <a:lnSpc>
+                <a:spcPts val="5599"/>
+              </a:lnSpc>
+              <a:buFont typeface="Arial" panose="020B0604020202020204" pitchFamily="34" charset="0"/>
+              <a:buChar char="•"/>
+            </a:pPr>
+            <a:r>
+              <a:rPr lang="hu-HU" sz="3999" dirty="0">
+                <a:solidFill>
+                  <a:srgbClr val="000000"/>
+                </a:solidFill>
+                <a:latin typeface="Roboto Light" panose="02000000000000000000" pitchFamily="2" charset="0"/>
+                <a:ea typeface="Roboto Light" panose="02000000000000000000" pitchFamily="2" charset="0"/>
+              </a:rPr>
+              <a:t>Teszt</a:t>
+            </a:r>
+            <a:endParaRPr lang="en-US" sz="3999" dirty="0">
+              <a:solidFill>
+                <a:srgbClr val="000000"/>
+              </a:solidFill>
+              <a:latin typeface="Roboto Light" panose="02000000000000000000" pitchFamily="2" charset="0"/>
+              <a:ea typeface="Roboto Light" panose="02000000000000000000" pitchFamily="2" charset="0"/>
+            </a:endParaRPr>
+          </a:p>
+        </p:txBody>
+      </p:sp>
+      <p:pic>
+        <p:nvPicPr>
+          <p:cNvPr id="16" name="Kép 15">
+            <a:extLst>
+              <a:ext uri="{FF2B5EF4-FFF2-40B4-BE49-F238E27FC236}">
+                <a16:creationId xmlns:a16="http://schemas.microsoft.com/office/drawing/2014/main" id="{81937759-E602-41F4-A80A-14CFCD5AB0EE}"/>
+              </a:ext>
+            </a:extLst>
+          </p:cNvPr>
+          <p:cNvPicPr>
+            <a:picLocks noChangeAspect="1"/>
+          </p:cNvPicPr>
+          <p:nvPr/>
+        </p:nvPicPr>
+        <p:blipFill>
+          <a:blip r:embed="rId4">
+            <a:extLst>
+              <a:ext uri="{28A0092B-C50C-407E-A947-70E740481C1C}">
+                <a14:useLocalDpi xmlns:a14="http://schemas.microsoft.com/office/drawing/2010/main" val="0"/>
+              </a:ext>
+            </a:extLst>
+          </a:blip>
+          <a:stretch>
+            <a:fillRect/>
+          </a:stretch>
+        </p:blipFill>
+        <p:spPr>
+          <a:xfrm>
+            <a:off x="8775638" y="2688091"/>
+            <a:ext cx="8130703" cy="6148844"/>
+          </a:xfrm>
+          <a:prstGeom prst="rect">
+            <a:avLst/>
+          </a:prstGeom>
+        </p:spPr>
+      </p:pic>
+      <p:sp>
+        <p:nvSpPr>
+          <p:cNvPr id="15" name="Szövegdoboz 14">
+            <a:extLst>
+              <a:ext uri="{FF2B5EF4-FFF2-40B4-BE49-F238E27FC236}">
+                <a16:creationId xmlns:a16="http://schemas.microsoft.com/office/drawing/2014/main" id="{01F98474-DDC4-4692-B4B1-A9178FF94A59}"/>
+              </a:ext>
+            </a:extLst>
+          </p:cNvPr>
+          <p:cNvSpPr txBox="1"/>
+          <p:nvPr/>
+        </p:nvSpPr>
+        <p:spPr>
+          <a:xfrm>
+            <a:off x="3834269" y="6599868"/>
+            <a:ext cx="990600" cy="369332"/>
+          </a:xfrm>
+          <a:prstGeom prst="rect">
+            <a:avLst/>
+          </a:prstGeom>
+          <a:noFill/>
+        </p:spPr>
+        <p:txBody>
+          <a:bodyPr wrap="square" rtlCol="0">
+            <a:spAutoFit/>
+          </a:bodyPr>
+          <a:lstStyle/>
+          <a:p>
+            <a:pPr marL="285750" indent="-285750">
+              <a:buClr>
+                <a:srgbClr val="00B050"/>
+              </a:buClr>
+              <a:buSzPct val="400000"/>
+              <a:buFont typeface="Wingdings" panose="05000000000000000000" pitchFamily="2" charset="2"/>
+              <a:buChar char="ü"/>
+            </a:pPr>
+            <a:r>
+              <a:rPr lang="en-US" dirty="0"/>
+              <a:t> </a:t>
+            </a:r>
+            <a:endParaRPr lang="hu-HU" dirty="0"/>
+          </a:p>
+        </p:txBody>
+      </p:sp>
+    </p:spTree>
+    <p:extLst>
+      <p:ext uri="{BB962C8B-B14F-4D97-AF65-F5344CB8AC3E}">
+        <p14:creationId xmlns:p14="http://schemas.microsoft.com/office/powerpoint/2010/main" val="1666384148"/>
+      </p:ext>
+    </p:extLst>
+  </p:cSld>
+  <p:clrMapOvr>
+    <a:masterClrMapping/>
+  </p:clrMapOvr>
+</p:sld>
+</file>
+
+<file path=ppt/slides/slide11.xml><?xml version="1.0" encoding="utf-8"?>
+<p:sld xmlns:a="http://schemas.openxmlformats.org/drawingml/2006/main" xmlns:r="http://schemas.openxmlformats.org/officeDocument/2006/relationships" xmlns:p="http://schemas.openxmlformats.org/presentationml/2006/main">
+  <p:cSld>
+    <p:spTree>
+      <p:nvGrpSpPr>
+        <p:cNvPr id="1" name=""/>
+        <p:cNvGrpSpPr/>
+        <p:nvPr/>
+      </p:nvGrpSpPr>
+      <p:grpSpPr>
+        <a:xfrm>
+          <a:off x="0" y="0"/>
+          <a:ext cx="0" cy="0"/>
+          <a:chOff x="0" y="0"/>
+          <a:chExt cx="0" cy="0"/>
+        </a:xfrm>
+      </p:grpSpPr>
+      <p:grpSp>
+        <p:nvGrpSpPr>
+          <p:cNvPr id="2" name="Group 2"/>
+          <p:cNvGrpSpPr/>
+          <p:nvPr/>
+        </p:nvGrpSpPr>
+        <p:grpSpPr>
+          <a:xfrm>
             <a:off x="0" y="-987551"/>
             <a:ext cx="18288000" cy="12262103"/>
             <a:chOff x="0" y="0"/>
@@ -7635,7 +8439,7 @@
                 </a:solidFill>
                 <a:latin typeface="Nunito Sans Heavy"/>
               </a:rPr>
-              <a:t>9</a:t>
+              <a:t>10</a:t>
             </a:r>
           </a:p>
         </p:txBody>
@@ -8179,7 +8983,7 @@
 </p:sld>
 </file>
 
-<file path=ppt/slides/slide11.xml><?xml version="1.0" encoding="utf-8"?>
+<file path=ppt/slides/slide12.xml><?xml version="1.0" encoding="utf-8"?>
 <p:sld xmlns:a="http://schemas.openxmlformats.org/drawingml/2006/main" xmlns:r="http://schemas.openxmlformats.org/officeDocument/2006/relationships" xmlns:p="http://schemas.openxmlformats.org/presentationml/2006/main">
   <p:cSld>
     <p:spTree>
@@ -14239,119 +15043,6 @@
           </a:p>
         </p:txBody>
       </p:sp>
-      <p:sp>
-        <p:nvSpPr>
-          <p:cNvPr id="14" name="TextBox 14"/>
-          <p:cNvSpPr txBox="1"/>
-          <p:nvPr/>
-        </p:nvSpPr>
-        <p:spPr>
-          <a:xfrm>
-            <a:off x="1381658" y="3203900"/>
-            <a:ext cx="8448142" cy="2103140"/>
-          </a:xfrm>
-          <a:prstGeom prst="rect">
-            <a:avLst/>
-          </a:prstGeom>
-        </p:spPr>
-        <p:txBody>
-          <a:bodyPr wrap="square" lIns="0" tIns="0" rIns="0" bIns="0" rtlCol="0" anchor="t">
-            <a:spAutoFit/>
-          </a:bodyPr>
-          <a:lstStyle/>
-          <a:p>
-            <a:pPr marL="571500" indent="-571500">
-              <a:lnSpc>
-                <a:spcPts val="5599"/>
-              </a:lnSpc>
-              <a:buFont typeface="Arial" panose="020B0604020202020204" pitchFamily="34" charset="0"/>
-              <a:buChar char="•"/>
-            </a:pPr>
-            <a:r>
-              <a:rPr lang="hu-HU" sz="3999" dirty="0">
-                <a:solidFill>
-                  <a:srgbClr val="000000"/>
-                </a:solidFill>
-                <a:latin typeface="Roboto Light" panose="02000000000000000000" pitchFamily="2" charset="0"/>
-                <a:ea typeface="Roboto Light" panose="02000000000000000000" pitchFamily="2" charset="0"/>
-              </a:rPr>
-              <a:t>rétegmodell</a:t>
-            </a:r>
-            <a:endParaRPr lang="en-US" sz="3999" dirty="0">
-              <a:solidFill>
-                <a:srgbClr val="000000"/>
-              </a:solidFill>
-              <a:latin typeface="Roboto Light" panose="02000000000000000000" pitchFamily="2" charset="0"/>
-              <a:ea typeface="Roboto Light" panose="02000000000000000000" pitchFamily="2" charset="0"/>
-            </a:endParaRPr>
-          </a:p>
-          <a:p>
-            <a:pPr marL="571500" indent="-571500">
-              <a:lnSpc>
-                <a:spcPts val="5599"/>
-              </a:lnSpc>
-              <a:buFont typeface="Arial" panose="020B0604020202020204" pitchFamily="34" charset="0"/>
-              <a:buChar char="•"/>
-            </a:pPr>
-            <a:r>
-              <a:rPr lang="hu-HU" sz="3999" dirty="0" err="1">
-                <a:solidFill>
-                  <a:srgbClr val="000000"/>
-                </a:solidFill>
-                <a:latin typeface="Roboto Light" panose="02000000000000000000" pitchFamily="2" charset="0"/>
-                <a:ea typeface="Roboto Light" panose="02000000000000000000" pitchFamily="2" charset="0"/>
-              </a:rPr>
-              <a:t>refcore_gendb</a:t>
-            </a:r>
-            <a:r>
-              <a:rPr lang="hu-HU" sz="3999" dirty="0">
-                <a:solidFill>
-                  <a:srgbClr val="000000"/>
-                </a:solidFill>
-                <a:latin typeface="Roboto Light" panose="02000000000000000000" pitchFamily="2" charset="0"/>
-                <a:ea typeface="Roboto Light" panose="02000000000000000000" pitchFamily="2" charset="0"/>
-              </a:rPr>
-              <a:t> viselkedés</a:t>
-            </a:r>
-          </a:p>
-          <a:p>
-            <a:pPr marL="571500" indent="-571500">
-              <a:lnSpc>
-                <a:spcPts val="5599"/>
-              </a:lnSpc>
-              <a:buFont typeface="Arial" panose="020B0604020202020204" pitchFamily="34" charset="0"/>
-              <a:buChar char="•"/>
-            </a:pPr>
-            <a:r>
-              <a:rPr lang="hu-HU" sz="3999" dirty="0" err="1">
-                <a:solidFill>
-                  <a:srgbClr val="000000"/>
-                </a:solidFill>
-                <a:latin typeface="Roboto Light" panose="02000000000000000000" pitchFamily="2" charset="0"/>
-                <a:ea typeface="Roboto Light" panose="02000000000000000000" pitchFamily="2" charset="0"/>
-              </a:rPr>
-              <a:t>path</a:t>
-            </a:r>
-            <a:r>
-              <a:rPr lang="hu-HU" sz="3999" dirty="0">
-                <a:solidFill>
-                  <a:srgbClr val="000000"/>
-                </a:solidFill>
-                <a:latin typeface="Roboto Light" panose="02000000000000000000" pitchFamily="2" charset="0"/>
-                <a:ea typeface="Roboto Light" panose="02000000000000000000" pitchFamily="2" charset="0"/>
-              </a:rPr>
-              <a:t> lekérdezések</a:t>
-            </a:r>
-            <a:endParaRPr lang="en-US" sz="3999" dirty="0">
-              <a:solidFill>
-                <a:srgbClr val="000000"/>
-              </a:solidFill>
-              <a:latin typeface="Roboto Light" panose="02000000000000000000" pitchFamily="2" charset="0"/>
-              <a:ea typeface="Roboto Light" panose="02000000000000000000" pitchFamily="2" charset="0"/>
-            </a:endParaRPr>
-          </a:p>
-        </p:txBody>
-      </p:sp>
       <p:pic>
         <p:nvPicPr>
           <p:cNvPr id="16" name="Kép 15">
@@ -14380,7 +15071,7 @@
         </p:blipFill>
         <p:spPr>
           <a:xfrm>
-            <a:off x="10515600" y="2247900"/>
+            <a:off x="9601200" y="2282207"/>
             <a:ext cx="6812663" cy="7335373"/>
           </a:xfrm>
           <a:prstGeom prst="rect">
@@ -14390,10 +15081,10 @@
       </p:pic>
       <p:pic>
         <p:nvPicPr>
-          <p:cNvPr id="18" name="Kép 17">
+          <p:cNvPr id="17" name="Kép 16">
             <a:extLst>
               <a:ext uri="{FF2B5EF4-FFF2-40B4-BE49-F238E27FC236}">
-                <a16:creationId xmlns:a16="http://schemas.microsoft.com/office/drawing/2014/main" id="{69B38DE2-8A4F-459A-BB48-DBB7B4046595}"/>
+                <a16:creationId xmlns:a16="http://schemas.microsoft.com/office/drawing/2014/main" id="{F133C671-A52A-4FD3-A918-BF3C53DB6B26}"/>
               </a:ext>
             </a:extLst>
           </p:cNvPr>
@@ -14416,19 +15107,126 @@
         </p:blipFill>
         <p:spPr>
           <a:xfrm>
-            <a:off x="785595" y="5652448"/>
-            <a:ext cx="9058719" cy="4131631"/>
+            <a:off x="2922239" y="4160786"/>
+            <a:ext cx="4802375" cy="5623294"/>
           </a:xfrm>
           <a:prstGeom prst="rect">
             <a:avLst/>
           </a:prstGeom>
-          <a:ln w="12700">
-            <a:solidFill>
-              <a:schemeClr val="tx1"/>
-            </a:solidFill>
+          <a:ln>
+            <a:noFill/>
           </a:ln>
         </p:spPr>
       </p:pic>
+      <p:sp>
+        <p:nvSpPr>
+          <p:cNvPr id="19" name="TextBox 14">
+            <a:extLst>
+              <a:ext uri="{FF2B5EF4-FFF2-40B4-BE49-F238E27FC236}">
+                <a16:creationId xmlns:a16="http://schemas.microsoft.com/office/drawing/2014/main" id="{D5396E2B-269B-4113-A8A2-2081F0E40424}"/>
+              </a:ext>
+            </a:extLst>
+          </p:cNvPr>
+          <p:cNvSpPr txBox="1"/>
+          <p:nvPr/>
+        </p:nvSpPr>
+        <p:spPr>
+          <a:xfrm>
+            <a:off x="2935656" y="1880630"/>
+            <a:ext cx="6371851" cy="2103140"/>
+          </a:xfrm>
+          <a:prstGeom prst="rect">
+            <a:avLst/>
+          </a:prstGeom>
+        </p:spPr>
+        <p:txBody>
+          <a:bodyPr wrap="square" lIns="0" tIns="0" rIns="0" bIns="0" rtlCol="0" anchor="t">
+            <a:spAutoFit/>
+          </a:bodyPr>
+          <a:lstStyle/>
+          <a:p>
+            <a:pPr marL="571500" indent="-571500">
+              <a:lnSpc>
+                <a:spcPts val="5599"/>
+              </a:lnSpc>
+              <a:buFont typeface="Arial" panose="020B0604020202020204" pitchFamily="34" charset="0"/>
+              <a:buChar char="•"/>
+            </a:pPr>
+            <a:r>
+              <a:rPr lang="en-US" sz="3999" dirty="0" err="1">
+                <a:solidFill>
+                  <a:srgbClr val="000000"/>
+                </a:solidFill>
+                <a:latin typeface="Roboto Light" panose="02000000000000000000" pitchFamily="2" charset="0"/>
+                <a:ea typeface="Roboto Light" panose="02000000000000000000" pitchFamily="2" charset="0"/>
+              </a:rPr>
+              <a:t>adatmodell</a:t>
+            </a:r>
+            <a:endParaRPr lang="en-US" sz="3999" dirty="0">
+              <a:solidFill>
+                <a:srgbClr val="000000"/>
+              </a:solidFill>
+              <a:latin typeface="Roboto Light" panose="02000000000000000000" pitchFamily="2" charset="0"/>
+              <a:ea typeface="Roboto Light" panose="02000000000000000000" pitchFamily="2" charset="0"/>
+            </a:endParaRPr>
+          </a:p>
+          <a:p>
+            <a:pPr marL="571500" indent="-571500">
+              <a:lnSpc>
+                <a:spcPts val="5599"/>
+              </a:lnSpc>
+              <a:buFont typeface="Arial" panose="020B0604020202020204" pitchFamily="34" charset="0"/>
+              <a:buChar char="•"/>
+            </a:pPr>
+            <a:r>
+              <a:rPr lang="hu-HU" sz="3999" dirty="0">
+                <a:solidFill>
+                  <a:srgbClr val="000000"/>
+                </a:solidFill>
+                <a:latin typeface="Roboto Light" panose="02000000000000000000" pitchFamily="2" charset="0"/>
+                <a:ea typeface="Roboto Light" panose="02000000000000000000" pitchFamily="2" charset="0"/>
+              </a:rPr>
+              <a:t>rétegmodell</a:t>
+            </a:r>
+            <a:endParaRPr lang="en-US" sz="3999" dirty="0">
+              <a:solidFill>
+                <a:srgbClr val="000000"/>
+              </a:solidFill>
+              <a:latin typeface="Roboto Light" panose="02000000000000000000" pitchFamily="2" charset="0"/>
+              <a:ea typeface="Roboto Light" panose="02000000000000000000" pitchFamily="2" charset="0"/>
+            </a:endParaRPr>
+          </a:p>
+          <a:p>
+            <a:pPr marL="571500" indent="-571500">
+              <a:lnSpc>
+                <a:spcPts val="5599"/>
+              </a:lnSpc>
+              <a:buFont typeface="Arial" panose="020B0604020202020204" pitchFamily="34" charset="0"/>
+              <a:buChar char="•"/>
+            </a:pPr>
+            <a:r>
+              <a:rPr lang="hu-HU" sz="3999" dirty="0" err="1">
+                <a:solidFill>
+                  <a:srgbClr val="000000"/>
+                </a:solidFill>
+                <a:latin typeface="Roboto Light" panose="02000000000000000000" pitchFamily="2" charset="0"/>
+                <a:ea typeface="Roboto Light" panose="02000000000000000000" pitchFamily="2" charset="0"/>
+              </a:rPr>
+              <a:t>refcore_gendb</a:t>
+            </a:r>
+            <a:r>
+              <a:rPr lang="hu-HU" sz="3999" dirty="0">
+                <a:solidFill>
+                  <a:srgbClr val="000000"/>
+                </a:solidFill>
+                <a:latin typeface="Roboto Light" panose="02000000000000000000" pitchFamily="2" charset="0"/>
+                <a:ea typeface="Roboto Light" panose="02000000000000000000" pitchFamily="2" charset="0"/>
+              </a:rPr>
+              <a:t> viselkedés</a:t>
+            </a:r>
+          </a:p>
+        </p:txBody>
+      </p:sp>
     </p:spTree>
     <p:extLst>
       <p:ext uri="{BB962C8B-B14F-4D97-AF65-F5344CB8AC3E}">
@@ -14461,13 +15259,7 @@
       </p:grpSpPr>
       <p:grpSp>
         <p:nvGrpSpPr>
-          <p:cNvPr id="26" name="Group 2">
-            <a:extLst>
-              <a:ext uri="{FF2B5EF4-FFF2-40B4-BE49-F238E27FC236}">
-                <a16:creationId xmlns:a16="http://schemas.microsoft.com/office/drawing/2014/main" id="{D9EF83F8-5B71-46E8-AFA1-D5A1570ABDA9}"/>
-              </a:ext>
-            </a:extLst>
-          </p:cNvPr>
+          <p:cNvPr id="2" name="Group 2"/>
           <p:cNvGrpSpPr/>
           <p:nvPr/>
         </p:nvGrpSpPr>
@@ -14481,13 +15273,7 @@
         </p:grpSpPr>
         <p:sp>
           <p:nvSpPr>
-            <p:cNvPr id="27" name="Freeform 3">
-              <a:extLst>
-                <a:ext uri="{FF2B5EF4-FFF2-40B4-BE49-F238E27FC236}">
-                  <a16:creationId xmlns:a16="http://schemas.microsoft.com/office/drawing/2014/main" id="{846D6998-8FF0-4AF9-8924-802ADA9A550F}"/>
-                </a:ext>
-              </a:extLst>
-            </p:cNvPr>
+            <p:cNvPr id="3" name="Freeform 3"/>
             <p:cNvSpPr/>
             <p:nvPr/>
           </p:nvSpPr>
@@ -14540,13 +15326,7 @@
         </p:sp>
         <p:sp>
           <p:nvSpPr>
-            <p:cNvPr id="28" name="Freeform 4">
-              <a:extLst>
-                <a:ext uri="{FF2B5EF4-FFF2-40B4-BE49-F238E27FC236}">
-                  <a16:creationId xmlns:a16="http://schemas.microsoft.com/office/drawing/2014/main" id="{8F7AA71D-19A5-4A83-8967-B82F196F4AD8}"/>
-                </a:ext>
-              </a:extLst>
-            </p:cNvPr>
+            <p:cNvPr id="4" name="Freeform 4"/>
             <p:cNvSpPr/>
             <p:nvPr/>
           </p:nvSpPr>
@@ -14599,13 +15379,7 @@
         </p:sp>
         <p:sp>
           <p:nvSpPr>
-            <p:cNvPr id="29" name="Freeform 5">
-              <a:extLst>
-                <a:ext uri="{FF2B5EF4-FFF2-40B4-BE49-F238E27FC236}">
-                  <a16:creationId xmlns:a16="http://schemas.microsoft.com/office/drawing/2014/main" id="{7DD88A6D-1394-4C72-B865-B020D23B0DC9}"/>
-                </a:ext>
-              </a:extLst>
-            </p:cNvPr>
+            <p:cNvPr id="5" name="Freeform 5"/>
             <p:cNvSpPr/>
             <p:nvPr/>
           </p:nvSpPr>
@@ -14658,13 +15432,7 @@
         </p:sp>
         <p:sp>
           <p:nvSpPr>
-            <p:cNvPr id="30" name="Freeform 6">
-              <a:extLst>
-                <a:ext uri="{FF2B5EF4-FFF2-40B4-BE49-F238E27FC236}">
-                  <a16:creationId xmlns:a16="http://schemas.microsoft.com/office/drawing/2014/main" id="{8824165E-C11C-4789-A64F-B3414D5146B4}"/>
-                </a:ext>
-              </a:extLst>
-            </p:cNvPr>
+            <p:cNvPr id="6" name="Freeform 6"/>
             <p:cNvSpPr/>
             <p:nvPr/>
           </p:nvSpPr>
@@ -14717,13 +15485,7 @@
         </p:sp>
         <p:sp>
           <p:nvSpPr>
-            <p:cNvPr id="31" name="Freeform 7">
-              <a:extLst>
-                <a:ext uri="{FF2B5EF4-FFF2-40B4-BE49-F238E27FC236}">
-                  <a16:creationId xmlns:a16="http://schemas.microsoft.com/office/drawing/2014/main" id="{B1AE0CEB-0ED6-461B-AFEC-6E928D39B09C}"/>
-                </a:ext>
-              </a:extLst>
-            </p:cNvPr>
+            <p:cNvPr id="7" name="Freeform 7"/>
             <p:cNvSpPr/>
             <p:nvPr/>
           </p:nvSpPr>
@@ -14776,13 +15538,7 @@
         </p:sp>
         <p:sp>
           <p:nvSpPr>
-            <p:cNvPr id="32" name="Freeform 8">
-              <a:extLst>
-                <a:ext uri="{FF2B5EF4-FFF2-40B4-BE49-F238E27FC236}">
-                  <a16:creationId xmlns:a16="http://schemas.microsoft.com/office/drawing/2014/main" id="{02AC49E8-AF04-4D9D-84DA-5A4BD52FED7C}"/>
-                </a:ext>
-              </a:extLst>
-            </p:cNvPr>
+            <p:cNvPr id="8" name="Freeform 8"/>
             <p:cNvSpPr/>
             <p:nvPr/>
           </p:nvSpPr>
@@ -14960,7 +15716,7 @@
               </a:lnSpc>
             </a:pPr>
             <a:r>
-              <a:rPr lang="hu-HU" sz="8000" dirty="0">
+              <a:rPr lang="en-US" sz="8000" dirty="0">
                 <a:solidFill>
                   <a:srgbClr val="FFFFFF"/>
                 </a:solidFill>
@@ -14968,12 +15724,6 @@
               </a:rPr>
               <a:t>6</a:t>
             </a:r>
-            <a:endParaRPr lang="en-US" sz="8000" dirty="0">
-              <a:solidFill>
-                <a:srgbClr val="FFFFFF"/>
-              </a:solidFill>
-              <a:latin typeface="Nunito Sans Heavy"/>
-            </a:endParaRPr>
           </a:p>
         </p:txBody>
       </p:sp>
@@ -14985,8 +15735,8 @@
         </p:nvSpPr>
         <p:spPr>
           <a:xfrm>
-            <a:off x="2329129" y="502681"/>
-            <a:ext cx="13629742" cy="1333635"/>
+            <a:off x="3057877" y="502920"/>
+            <a:ext cx="12172245" cy="1333635"/>
           </a:xfrm>
           <a:prstGeom prst="rect">
             <a:avLst/>
@@ -15004,6 +15754,16 @@
               </a:lnSpc>
             </a:pPr>
             <a:r>
+              <a:rPr lang="en-US" sz="8000" dirty="0">
+                <a:solidFill>
+                  <a:srgbClr val="004AAD"/>
+                </a:solidFill>
+                <a:latin typeface="Roboto Medium" panose="02000000000000000000" pitchFamily="2" charset="0"/>
+                <a:ea typeface="Roboto Medium" panose="02000000000000000000" pitchFamily="2" charset="0"/>
+              </a:rPr>
+              <a:t>Map </a:t>
+            </a:r>
+            <a:r>
               <a:rPr lang="en-US" sz="8000" dirty="0" err="1">
                 <a:solidFill>
                   <a:srgbClr val="004AAD"/>
@@ -15011,7 +15771,7 @@
                 <a:latin typeface="Roboto Medium" panose="02000000000000000000" pitchFamily="2" charset="0"/>
                 <a:ea typeface="Roboto Medium" panose="02000000000000000000" pitchFamily="2" charset="0"/>
               </a:rPr>
-              <a:t>Eredmények</a:t>
+              <a:t>alapú</a:t>
             </a:r>
             <a:r>
               <a:rPr lang="en-US" sz="8000" dirty="0">
@@ -15031,7 +15791,7 @@
                 <a:latin typeface="Roboto Medium" panose="02000000000000000000" pitchFamily="2" charset="0"/>
                 <a:ea typeface="Roboto Medium" panose="02000000000000000000" pitchFamily="2" charset="0"/>
               </a:rPr>
-              <a:t>kiértékelése</a:t>
+              <a:t>adatréteg</a:t>
             </a:r>
             <a:endParaRPr lang="en-US" sz="8000" dirty="0">
               <a:solidFill>
@@ -15051,8 +15811,8 @@
         </p:nvSpPr>
         <p:spPr>
           <a:xfrm>
-            <a:off x="1381659" y="2911985"/>
-            <a:ext cx="5400142" cy="2103140"/>
+            <a:off x="4919928" y="2404188"/>
+            <a:ext cx="8448142" cy="666849"/>
           </a:xfrm>
           <a:prstGeom prst="rect">
             <a:avLst/>
@@ -15064,30 +15824,21 @@
           </a:bodyPr>
           <a:lstStyle/>
           <a:p>
-            <a:pPr>
+            <a:pPr algn="ctr">
               <a:lnSpc>
                 <a:spcPts val="5599"/>
               </a:lnSpc>
             </a:pPr>
             <a:r>
-              <a:rPr lang="hu-HU" sz="3999" dirty="0">
+              <a:rPr lang="en-US" sz="3999" dirty="0">
                 <a:solidFill>
                   <a:srgbClr val="000000"/>
                 </a:solidFill>
-                <a:latin typeface="Roboto Medium" panose="02000000000000000000" pitchFamily="2" charset="0"/>
-                <a:ea typeface="Roboto Medium" panose="02000000000000000000" pitchFamily="2" charset="0"/>
+                <a:latin typeface="Roboto Light" panose="02000000000000000000" pitchFamily="2" charset="0"/>
+                <a:ea typeface="Roboto Light" panose="02000000000000000000" pitchFamily="2" charset="0"/>
               </a:rPr>
-              <a:t>Adatbetöltés</a:t>
-            </a:r>
-          </a:p>
-          <a:p>
-            <a:pPr marL="571500" indent="-571500">
-              <a:lnSpc>
-                <a:spcPts val="5599"/>
-              </a:lnSpc>
-              <a:buFont typeface="Arial" panose="020B0604020202020204" pitchFamily="34" charset="0"/>
-              <a:buChar char="•"/>
-            </a:pPr>
+              <a:t>P</a:t>
+            </a:r>
             <a:r>
               <a:rPr lang="hu-HU" sz="3999" dirty="0" err="1">
                 <a:solidFill>
@@ -15096,7 +15847,7 @@
                 <a:latin typeface="Roboto Light" panose="02000000000000000000" pitchFamily="2" charset="0"/>
                 <a:ea typeface="Roboto Light" panose="02000000000000000000" pitchFamily="2" charset="0"/>
               </a:rPr>
-              <a:t>Mnesia</a:t>
+              <a:t>ath</a:t>
             </a:r>
             <a:r>
               <a:rPr lang="hu-HU" sz="3999" dirty="0">
@@ -15106,7 +15857,7 @@
                 <a:latin typeface="Roboto Light" panose="02000000000000000000" pitchFamily="2" charset="0"/>
                 <a:ea typeface="Roboto Light" panose="02000000000000000000" pitchFamily="2" charset="0"/>
               </a:rPr>
-              <a:t> alkalmazás kódbázisa</a:t>
+              <a:t> lekérdezések</a:t>
             </a:r>
             <a:endParaRPr lang="en-US" sz="3999" dirty="0">
               <a:solidFill>
@@ -15120,10 +15871,10 @@
       </p:sp>
       <p:pic>
         <p:nvPicPr>
-          <p:cNvPr id="16" name="Kép 15">
+          <p:cNvPr id="18" name="Kép 17">
             <a:extLst>
               <a:ext uri="{FF2B5EF4-FFF2-40B4-BE49-F238E27FC236}">
-                <a16:creationId xmlns:a16="http://schemas.microsoft.com/office/drawing/2014/main" id="{574D51B3-7E01-4373-8090-7CFCAA649F9E}"/>
+                <a16:creationId xmlns:a16="http://schemas.microsoft.com/office/drawing/2014/main" id="{69B38DE2-8A4F-459A-BB48-DBB7B4046595}"/>
               </a:ext>
             </a:extLst>
           </p:cNvPr>
@@ -15133,7 +15884,7 @@
           <p:nvPr/>
         </p:nvPicPr>
         <p:blipFill>
-          <a:blip r:embed="rId4">
+          <a:blip r:embed="rId4" cstate="print">
             <a:extLst>
               <a:ext uri="{28A0092B-C50C-407E-A947-70E740481C1C}">
                 <a14:useLocalDpi xmlns:a14="http://schemas.microsoft.com/office/drawing/2010/main" val="0"/>
@@ -15146,327 +15897,23 @@
         </p:blipFill>
         <p:spPr>
           <a:xfrm>
-            <a:off x="6736506" y="2561000"/>
-            <a:ext cx="10805301" cy="3915198"/>
+            <a:off x="3074422" y="3638669"/>
+            <a:ext cx="12698978" cy="5791933"/>
           </a:xfrm>
           <a:prstGeom prst="rect">
             <a:avLst/>
           </a:prstGeom>
-        </p:spPr>
-      </p:pic>
-      <p:sp>
-        <p:nvSpPr>
-          <p:cNvPr id="17" name="TextBox 14">
-            <a:extLst>
-              <a:ext uri="{FF2B5EF4-FFF2-40B4-BE49-F238E27FC236}">
-                <a16:creationId xmlns:a16="http://schemas.microsoft.com/office/drawing/2014/main" id="{C56D059F-E9E8-4D4B-9EDF-7624E83BC3A1}"/>
-              </a:ext>
-            </a:extLst>
-          </p:cNvPr>
-          <p:cNvSpPr txBox="1"/>
-          <p:nvPr/>
-        </p:nvSpPr>
-        <p:spPr>
-          <a:xfrm>
-            <a:off x="1381658" y="5426058"/>
-            <a:ext cx="8768039" cy="3539430"/>
-          </a:xfrm>
-          <a:prstGeom prst="rect">
-            <a:avLst/>
-          </a:prstGeom>
-        </p:spPr>
-        <p:txBody>
-          <a:bodyPr wrap="square" lIns="0" tIns="0" rIns="0" bIns="0" rtlCol="0" anchor="t">
-            <a:spAutoFit/>
-          </a:bodyPr>
-          <a:lstStyle/>
-          <a:p>
-            <a:pPr>
-              <a:lnSpc>
-                <a:spcPts val="5599"/>
-              </a:lnSpc>
-            </a:pPr>
-            <a:r>
-              <a:rPr lang="hu-HU" sz="3999" dirty="0">
-                <a:solidFill>
-                  <a:srgbClr val="000000"/>
-                </a:solidFill>
-                <a:latin typeface="Roboto Medium" panose="02000000000000000000" pitchFamily="2" charset="0"/>
-                <a:ea typeface="Roboto Medium" panose="02000000000000000000" pitchFamily="2" charset="0"/>
-              </a:rPr>
-              <a:t>Lekérdezések</a:t>
-            </a:r>
-          </a:p>
-          <a:p>
-            <a:pPr marL="571500" indent="-571500">
-              <a:lnSpc>
-                <a:spcPts val="5599"/>
-              </a:lnSpc>
-              <a:buFont typeface="Arial" panose="020B0604020202020204" pitchFamily="34" charset="0"/>
-              <a:buChar char="•"/>
-            </a:pPr>
-            <a:r>
-              <a:rPr lang="hu-HU" sz="3999" dirty="0">
-                <a:solidFill>
-                  <a:srgbClr val="000000"/>
-                </a:solidFill>
-                <a:latin typeface="Roboto Light" panose="02000000000000000000" pitchFamily="2" charset="0"/>
-                <a:ea typeface="Roboto Light" panose="02000000000000000000" pitchFamily="2" charset="0"/>
-              </a:rPr>
-              <a:t>13 db lekérdezés</a:t>
-            </a:r>
-          </a:p>
-          <a:p>
-            <a:pPr marL="571500" indent="-571500">
-              <a:lnSpc>
-                <a:spcPts val="5599"/>
-              </a:lnSpc>
-              <a:buFont typeface="Arial" panose="020B0604020202020204" pitchFamily="34" charset="0"/>
-              <a:buChar char="•"/>
-            </a:pPr>
-            <a:r>
-              <a:rPr lang="hu-HU" sz="3999" dirty="0">
-                <a:solidFill>
-                  <a:srgbClr val="000000"/>
-                </a:solidFill>
-                <a:latin typeface="Roboto Light" panose="02000000000000000000" pitchFamily="2" charset="0"/>
-                <a:ea typeface="Roboto Light" panose="02000000000000000000" pitchFamily="2" charset="0"/>
-              </a:rPr>
-              <a:t>2 adatbázison:</a:t>
-            </a:r>
-          </a:p>
-          <a:p>
-            <a:pPr marL="1028700" lvl="1" indent="-571500">
-              <a:lnSpc>
-                <a:spcPts val="5599"/>
-              </a:lnSpc>
-              <a:buFontTx/>
-              <a:buChar char="→"/>
-            </a:pPr>
-            <a:r>
-              <a:rPr lang="pt-BR" sz="3999" dirty="0">
-                <a:solidFill>
-                  <a:srgbClr val="000000"/>
-                </a:solidFill>
-                <a:latin typeface="Roboto Light" panose="02000000000000000000" pitchFamily="2" charset="0"/>
-                <a:ea typeface="Roboto Light" panose="02000000000000000000" pitchFamily="2" charset="0"/>
-              </a:rPr>
-              <a:t>94</a:t>
-            </a:r>
-            <a:r>
-              <a:rPr lang="hu-HU" sz="3999" dirty="0">
-                <a:solidFill>
-                  <a:srgbClr val="000000"/>
-                </a:solidFill>
-                <a:latin typeface="Roboto Light" panose="02000000000000000000" pitchFamily="2" charset="0"/>
-                <a:ea typeface="Roboto Light" panose="02000000000000000000" pitchFamily="2" charset="0"/>
-              </a:rPr>
-              <a:t>,</a:t>
-            </a:r>
-            <a:r>
-              <a:rPr lang="pt-BR" sz="3999" dirty="0">
-                <a:solidFill>
-                  <a:srgbClr val="000000"/>
-                </a:solidFill>
-                <a:latin typeface="Roboto Light" panose="02000000000000000000" pitchFamily="2" charset="0"/>
-                <a:ea typeface="Roboto Light" panose="02000000000000000000" pitchFamily="2" charset="0"/>
-              </a:rPr>
-              <a:t>515 csúcs</a:t>
-            </a:r>
-            <a:r>
-              <a:rPr lang="en-US" sz="3999" dirty="0">
-                <a:solidFill>
-                  <a:srgbClr val="000000"/>
-                </a:solidFill>
-                <a:latin typeface="Roboto Light" panose="02000000000000000000" pitchFamily="2" charset="0"/>
-                <a:ea typeface="Roboto Light" panose="02000000000000000000" pitchFamily="2" charset="0"/>
-              </a:rPr>
-              <a:t> </a:t>
-            </a:r>
-            <a:r>
-              <a:rPr lang="en-US" sz="3999" dirty="0" err="1">
-                <a:solidFill>
-                  <a:srgbClr val="000000"/>
-                </a:solidFill>
-                <a:latin typeface="Roboto Light" panose="02000000000000000000" pitchFamily="2" charset="0"/>
-                <a:ea typeface="Roboto Light" panose="02000000000000000000" pitchFamily="2" charset="0"/>
-              </a:rPr>
-              <a:t>és</a:t>
-            </a:r>
-            <a:r>
-              <a:rPr lang="pt-BR" sz="3999" dirty="0">
-                <a:solidFill>
-                  <a:srgbClr val="000000"/>
-                </a:solidFill>
-                <a:latin typeface="Roboto Light" panose="02000000000000000000" pitchFamily="2" charset="0"/>
-                <a:ea typeface="Roboto Light" panose="02000000000000000000" pitchFamily="2" charset="0"/>
-              </a:rPr>
-              <a:t> 890</a:t>
-            </a:r>
-            <a:r>
-              <a:rPr lang="hu-HU" sz="3999" dirty="0">
-                <a:solidFill>
-                  <a:srgbClr val="000000"/>
-                </a:solidFill>
-                <a:latin typeface="Roboto Light" panose="02000000000000000000" pitchFamily="2" charset="0"/>
-                <a:ea typeface="Roboto Light" panose="02000000000000000000" pitchFamily="2" charset="0"/>
-              </a:rPr>
-              <a:t>,</a:t>
-            </a:r>
-            <a:r>
-              <a:rPr lang="pt-BR" sz="3999" dirty="0">
-                <a:solidFill>
-                  <a:srgbClr val="000000"/>
-                </a:solidFill>
-                <a:latin typeface="Roboto Light" panose="02000000000000000000" pitchFamily="2" charset="0"/>
-                <a:ea typeface="Roboto Light" panose="02000000000000000000" pitchFamily="2" charset="0"/>
-              </a:rPr>
-              <a:t>089 é</a:t>
-            </a:r>
-            <a:r>
-              <a:rPr lang="hu-HU" sz="3999" dirty="0">
-                <a:solidFill>
-                  <a:srgbClr val="000000"/>
-                </a:solidFill>
-                <a:latin typeface="Roboto Light" panose="02000000000000000000" pitchFamily="2" charset="0"/>
-                <a:ea typeface="Roboto Light" panose="02000000000000000000" pitchFamily="2" charset="0"/>
-              </a:rPr>
-              <a:t>l</a:t>
-            </a:r>
-            <a:endParaRPr lang="en-US" sz="3999" dirty="0">
-              <a:solidFill>
-                <a:srgbClr val="000000"/>
-              </a:solidFill>
-              <a:latin typeface="Roboto Light" panose="02000000000000000000" pitchFamily="2" charset="0"/>
-              <a:ea typeface="Roboto Light" panose="02000000000000000000" pitchFamily="2" charset="0"/>
-            </a:endParaRPr>
-          </a:p>
-          <a:p>
-            <a:pPr marL="1028700" lvl="1" indent="-571500">
-              <a:lnSpc>
-                <a:spcPts val="5599"/>
-              </a:lnSpc>
-              <a:buFontTx/>
-              <a:buChar char="→"/>
-            </a:pPr>
-            <a:r>
-              <a:rPr lang="hu-HU" sz="3999" dirty="0">
-                <a:solidFill>
-                  <a:srgbClr val="000000"/>
-                </a:solidFill>
-                <a:latin typeface="Roboto Light" panose="02000000000000000000" pitchFamily="2" charset="0"/>
-                <a:ea typeface="Roboto Light" panose="02000000000000000000" pitchFamily="2" charset="0"/>
-              </a:rPr>
-              <a:t>9</a:t>
-            </a:r>
-            <a:r>
-              <a:rPr lang="es-ES" sz="3999" dirty="0">
-                <a:solidFill>
-                  <a:srgbClr val="000000"/>
-                </a:solidFill>
-                <a:latin typeface="Roboto Light" panose="02000000000000000000" pitchFamily="2" charset="0"/>
-                <a:ea typeface="Roboto Light" panose="02000000000000000000" pitchFamily="2" charset="0"/>
-              </a:rPr>
-              <a:t>57,163 csúcs</a:t>
-            </a:r>
-            <a:r>
-              <a:rPr lang="en-US" sz="3999" dirty="0">
-                <a:solidFill>
-                  <a:srgbClr val="000000"/>
-                </a:solidFill>
-                <a:latin typeface="Roboto Light" panose="02000000000000000000" pitchFamily="2" charset="0"/>
-                <a:ea typeface="Roboto Light" panose="02000000000000000000" pitchFamily="2" charset="0"/>
-              </a:rPr>
-              <a:t> </a:t>
-            </a:r>
-            <a:r>
-              <a:rPr lang="en-US" sz="3999" dirty="0" err="1">
-                <a:solidFill>
-                  <a:srgbClr val="000000"/>
-                </a:solidFill>
-                <a:latin typeface="Roboto Light" panose="02000000000000000000" pitchFamily="2" charset="0"/>
-                <a:ea typeface="Roboto Light" panose="02000000000000000000" pitchFamily="2" charset="0"/>
-              </a:rPr>
-              <a:t>és</a:t>
-            </a:r>
-            <a:r>
-              <a:rPr lang="es-ES" sz="3999" dirty="0">
-                <a:solidFill>
-                  <a:srgbClr val="000000"/>
-                </a:solidFill>
-                <a:latin typeface="Roboto Light" panose="02000000000000000000" pitchFamily="2" charset="0"/>
-                <a:ea typeface="Roboto Light" panose="02000000000000000000" pitchFamily="2" charset="0"/>
-              </a:rPr>
-              <a:t> 2,110,396 él</a:t>
-            </a:r>
-            <a:endParaRPr lang="en-US" sz="3999" dirty="0">
-              <a:solidFill>
-                <a:srgbClr val="000000"/>
-              </a:solidFill>
-              <a:latin typeface="Roboto Light" panose="02000000000000000000" pitchFamily="2" charset="0"/>
-              <a:ea typeface="Roboto Light" panose="02000000000000000000" pitchFamily="2" charset="0"/>
-            </a:endParaRPr>
-          </a:p>
-        </p:txBody>
-      </p:sp>
-      <p:sp>
-        <p:nvSpPr>
-          <p:cNvPr id="18" name="Téglalap: lekerekített 17">
-            <a:extLst>
-              <a:ext uri="{FF2B5EF4-FFF2-40B4-BE49-F238E27FC236}">
-                <a16:creationId xmlns:a16="http://schemas.microsoft.com/office/drawing/2014/main" id="{74E6F5E2-F06C-470B-BF16-7C37F391EF6B}"/>
-              </a:ext>
-            </a:extLst>
-          </p:cNvPr>
-          <p:cNvSpPr/>
-          <p:nvPr/>
-        </p:nvSpPr>
-        <p:spPr>
-          <a:xfrm>
-            <a:off x="16230600" y="5753100"/>
-            <a:ext cx="1171350" cy="483352"/>
-          </a:xfrm>
-          <a:prstGeom prst="roundRect">
-            <a:avLst/>
-          </a:prstGeom>
-          <a:noFill/>
-          <a:ln>
+          <a:ln w="12700">
             <a:solidFill>
-              <a:schemeClr val="accent3">
-                <a:lumMod val="75000"/>
-              </a:schemeClr>
+              <a:schemeClr val="tx1"/>
             </a:solidFill>
           </a:ln>
         </p:spPr>
-        <p:style>
-          <a:lnRef idx="2">
-            <a:schemeClr val="accent1">
-              <a:shade val="50000"/>
-            </a:schemeClr>
-          </a:lnRef>
-          <a:fillRef idx="1">
-            <a:schemeClr val="accent1"/>
-          </a:fillRef>
-          <a:effectRef idx="0">
-            <a:schemeClr val="accent1"/>
-          </a:effectRef>
-          <a:fontRef idx="minor">
-            <a:schemeClr val="lt1"/>
-          </a:fontRef>
-        </p:style>
-        <p:txBody>
-          <a:bodyPr rtlCol="0" anchor="ctr"/>
-          <a:lstStyle/>
-          <a:p>
-            <a:pPr algn="ctr"/>
-            <a:endParaRPr lang="hu-HU"/>
-          </a:p>
-        </p:txBody>
-      </p:sp>
+      </p:pic>
     </p:spTree>
     <p:extLst>
       <p:ext uri="{BB962C8B-B14F-4D97-AF65-F5344CB8AC3E}">
-        <p14:creationId xmlns:p14="http://schemas.microsoft.com/office/powerpoint/2010/main" val="1069095919"/>
+        <p14:creationId xmlns:p14="http://schemas.microsoft.com/office/powerpoint/2010/main" val="994883213"/>
       </p:ext>
     </p:extLst>
   </p:cSld>
@@ -15495,13 +15942,19 @@
       </p:grpSpPr>
       <p:grpSp>
         <p:nvGrpSpPr>
-          <p:cNvPr id="2" name="Group 2"/>
+          <p:cNvPr id="26" name="Group 2">
+            <a:extLst>
+              <a:ext uri="{FF2B5EF4-FFF2-40B4-BE49-F238E27FC236}">
+                <a16:creationId xmlns:a16="http://schemas.microsoft.com/office/drawing/2014/main" id="{D9EF83F8-5B71-46E8-AFA1-D5A1570ABDA9}"/>
+              </a:ext>
+            </a:extLst>
+          </p:cNvPr>
           <p:cNvGrpSpPr/>
           <p:nvPr/>
         </p:nvGrpSpPr>
         <p:grpSpPr>
           <a:xfrm>
-            <a:off x="-18143" y="328784"/>
+            <a:off x="0" y="-987551"/>
             <a:ext cx="18288000" cy="12262103"/>
             <a:chOff x="0" y="0"/>
             <a:chExt cx="24384000" cy="16349470"/>
@@ -15509,7 +15962,13 @@
         </p:grpSpPr>
         <p:sp>
           <p:nvSpPr>
-            <p:cNvPr id="3" name="Freeform 3"/>
+            <p:cNvPr id="27" name="Freeform 3">
+              <a:extLst>
+                <a:ext uri="{FF2B5EF4-FFF2-40B4-BE49-F238E27FC236}">
+                  <a16:creationId xmlns:a16="http://schemas.microsoft.com/office/drawing/2014/main" id="{846D6998-8FF0-4AF9-8924-802ADA9A550F}"/>
+                </a:ext>
+              </a:extLst>
+            </p:cNvPr>
             <p:cNvSpPr/>
             <p:nvPr/>
           </p:nvSpPr>
@@ -15562,7 +16021,13 @@
         </p:sp>
         <p:sp>
           <p:nvSpPr>
-            <p:cNvPr id="4" name="Freeform 4"/>
+            <p:cNvPr id="28" name="Freeform 4">
+              <a:extLst>
+                <a:ext uri="{FF2B5EF4-FFF2-40B4-BE49-F238E27FC236}">
+                  <a16:creationId xmlns:a16="http://schemas.microsoft.com/office/drawing/2014/main" id="{8F7AA71D-19A5-4A83-8967-B82F196F4AD8}"/>
+                </a:ext>
+              </a:extLst>
+            </p:cNvPr>
             <p:cNvSpPr/>
             <p:nvPr/>
           </p:nvSpPr>
@@ -15615,7 +16080,13 @@
         </p:sp>
         <p:sp>
           <p:nvSpPr>
-            <p:cNvPr id="5" name="Freeform 5"/>
+            <p:cNvPr id="29" name="Freeform 5">
+              <a:extLst>
+                <a:ext uri="{FF2B5EF4-FFF2-40B4-BE49-F238E27FC236}">
+                  <a16:creationId xmlns:a16="http://schemas.microsoft.com/office/drawing/2014/main" id="{7DD88A6D-1394-4C72-B865-B020D23B0DC9}"/>
+                </a:ext>
+              </a:extLst>
+            </p:cNvPr>
             <p:cNvSpPr/>
             <p:nvPr/>
           </p:nvSpPr>
@@ -15668,7 +16139,13 @@
         </p:sp>
         <p:sp>
           <p:nvSpPr>
-            <p:cNvPr id="6" name="Freeform 6"/>
+            <p:cNvPr id="30" name="Freeform 6">
+              <a:extLst>
+                <a:ext uri="{FF2B5EF4-FFF2-40B4-BE49-F238E27FC236}">
+                  <a16:creationId xmlns:a16="http://schemas.microsoft.com/office/drawing/2014/main" id="{8824165E-C11C-4789-A64F-B3414D5146B4}"/>
+                </a:ext>
+              </a:extLst>
+            </p:cNvPr>
             <p:cNvSpPr/>
             <p:nvPr/>
           </p:nvSpPr>
@@ -15721,7 +16198,13 @@
         </p:sp>
         <p:sp>
           <p:nvSpPr>
-            <p:cNvPr id="7" name="Freeform 7"/>
+            <p:cNvPr id="31" name="Freeform 7">
+              <a:extLst>
+                <a:ext uri="{FF2B5EF4-FFF2-40B4-BE49-F238E27FC236}">
+                  <a16:creationId xmlns:a16="http://schemas.microsoft.com/office/drawing/2014/main" id="{B1AE0CEB-0ED6-461B-AFEC-6E928D39B09C}"/>
+                </a:ext>
+              </a:extLst>
+            </p:cNvPr>
             <p:cNvSpPr/>
             <p:nvPr/>
           </p:nvSpPr>
@@ -15774,7 +16257,13 @@
         </p:sp>
         <p:sp>
           <p:nvSpPr>
-            <p:cNvPr id="8" name="Freeform 8"/>
+            <p:cNvPr id="32" name="Freeform 8">
+              <a:extLst>
+                <a:ext uri="{FF2B5EF4-FFF2-40B4-BE49-F238E27FC236}">
+                  <a16:creationId xmlns:a16="http://schemas.microsoft.com/office/drawing/2014/main" id="{02AC49E8-AF04-4D9D-84DA-5A4BD52FED7C}"/>
+                </a:ext>
+              </a:extLst>
+            </p:cNvPr>
             <p:cNvSpPr/>
             <p:nvPr/>
           </p:nvSpPr>
@@ -16031,10 +16520,121 @@
       </p:sp>
       <p:sp>
         <p:nvSpPr>
-          <p:cNvPr id="15" name="Szövegdoboz 14">
+          <p:cNvPr id="14" name="TextBox 14"/>
+          <p:cNvSpPr txBox="1"/>
+          <p:nvPr/>
+        </p:nvSpPr>
+        <p:spPr>
+          <a:xfrm>
+            <a:off x="1381659" y="2911985"/>
+            <a:ext cx="5400142" cy="2103140"/>
+          </a:xfrm>
+          <a:prstGeom prst="rect">
+            <a:avLst/>
+          </a:prstGeom>
+        </p:spPr>
+        <p:txBody>
+          <a:bodyPr wrap="square" lIns="0" tIns="0" rIns="0" bIns="0" rtlCol="0" anchor="t">
+            <a:spAutoFit/>
+          </a:bodyPr>
+          <a:lstStyle/>
+          <a:p>
+            <a:pPr>
+              <a:lnSpc>
+                <a:spcPts val="5599"/>
+              </a:lnSpc>
+            </a:pPr>
+            <a:r>
+              <a:rPr lang="hu-HU" sz="3999" dirty="0">
+                <a:solidFill>
+                  <a:srgbClr val="000000"/>
+                </a:solidFill>
+                <a:latin typeface="Roboto Medium" panose="02000000000000000000" pitchFamily="2" charset="0"/>
+                <a:ea typeface="Roboto Medium" panose="02000000000000000000" pitchFamily="2" charset="0"/>
+              </a:rPr>
+              <a:t>Adatbetöltés</a:t>
+            </a:r>
+          </a:p>
+          <a:p>
+            <a:pPr marL="571500" indent="-571500">
+              <a:lnSpc>
+                <a:spcPts val="5599"/>
+              </a:lnSpc>
+              <a:buFont typeface="Arial" panose="020B0604020202020204" pitchFamily="34" charset="0"/>
+              <a:buChar char="•"/>
+            </a:pPr>
+            <a:r>
+              <a:rPr lang="hu-HU" sz="3999" dirty="0" err="1">
+                <a:solidFill>
+                  <a:srgbClr val="000000"/>
+                </a:solidFill>
+                <a:latin typeface="Roboto Light" panose="02000000000000000000" pitchFamily="2" charset="0"/>
+                <a:ea typeface="Roboto Light" panose="02000000000000000000" pitchFamily="2" charset="0"/>
+              </a:rPr>
+              <a:t>Mnesia</a:t>
+            </a:r>
+            <a:r>
+              <a:rPr lang="hu-HU" sz="3999" dirty="0">
+                <a:solidFill>
+                  <a:srgbClr val="000000"/>
+                </a:solidFill>
+                <a:latin typeface="Roboto Light" panose="02000000000000000000" pitchFamily="2" charset="0"/>
+                <a:ea typeface="Roboto Light" panose="02000000000000000000" pitchFamily="2" charset="0"/>
+              </a:rPr>
+              <a:t> alkalmazás kódbázisa</a:t>
+            </a:r>
+            <a:endParaRPr lang="en-US" sz="3999" dirty="0">
+              <a:solidFill>
+                <a:srgbClr val="000000"/>
+              </a:solidFill>
+              <a:latin typeface="Roboto Light" panose="02000000000000000000" pitchFamily="2" charset="0"/>
+              <a:ea typeface="Roboto Light" panose="02000000000000000000" pitchFamily="2" charset="0"/>
+            </a:endParaRPr>
+          </a:p>
+        </p:txBody>
+      </p:sp>
+      <p:pic>
+        <p:nvPicPr>
+          <p:cNvPr id="16" name="Kép 15">
             <a:extLst>
               <a:ext uri="{FF2B5EF4-FFF2-40B4-BE49-F238E27FC236}">
-                <a16:creationId xmlns:a16="http://schemas.microsoft.com/office/drawing/2014/main" id="{4EDCD450-E991-4880-AE61-B3FB156CC9C4}"/>
+                <a16:creationId xmlns:a16="http://schemas.microsoft.com/office/drawing/2014/main" id="{574D51B3-7E01-4373-8090-7CFCAA649F9E}"/>
+              </a:ext>
+            </a:extLst>
+          </p:cNvPr>
+          <p:cNvPicPr>
+            <a:picLocks noChangeAspect="1"/>
+          </p:cNvPicPr>
+          <p:nvPr/>
+        </p:nvPicPr>
+        <p:blipFill>
+          <a:blip r:embed="rId4">
+            <a:extLst>
+              <a:ext uri="{28A0092B-C50C-407E-A947-70E740481C1C}">
+                <a14:useLocalDpi xmlns:a14="http://schemas.microsoft.com/office/drawing/2010/main" val="0"/>
+              </a:ext>
+            </a:extLst>
+          </a:blip>
+          <a:stretch>
+            <a:fillRect/>
+          </a:stretch>
+        </p:blipFill>
+        <p:spPr>
+          <a:xfrm>
+            <a:off x="6736506" y="2561000"/>
+            <a:ext cx="10805301" cy="3915198"/>
+          </a:xfrm>
+          <a:prstGeom prst="rect">
+            <a:avLst/>
+          </a:prstGeom>
+        </p:spPr>
+      </p:pic>
+      <p:sp>
+        <p:nvSpPr>
+          <p:cNvPr id="17" name="TextBox 14">
+            <a:extLst>
+              <a:ext uri="{FF2B5EF4-FFF2-40B4-BE49-F238E27FC236}">
+                <a16:creationId xmlns:a16="http://schemas.microsoft.com/office/drawing/2014/main" id="{C56D059F-E9E8-4D4B-9EDF-7624E83BC3A1}"/>
               </a:ext>
             </a:extLst>
           </p:cNvPr>
@@ -16043,276 +16643,305 @@
         </p:nvSpPr>
         <p:spPr>
           <a:xfrm>
-            <a:off x="3180577" y="2048009"/>
-            <a:ext cx="4237057" cy="707886"/>
+            <a:off x="1381658" y="5426058"/>
+            <a:ext cx="8768039" cy="3539430"/>
           </a:xfrm>
           <a:prstGeom prst="rect">
             <a:avLst/>
           </a:prstGeom>
-          <a:noFill/>
         </p:spPr>
         <p:txBody>
-          <a:bodyPr wrap="none" rtlCol="0">
+          <a:bodyPr wrap="square" lIns="0" tIns="0" rIns="0" bIns="0" rtlCol="0" anchor="t">
             <a:spAutoFit/>
           </a:bodyPr>
           <a:lstStyle/>
           <a:p>
-            <a:r>
-              <a:rPr lang="hu-HU" sz="4000" dirty="0">
+            <a:pPr>
+              <a:lnSpc>
+                <a:spcPts val="5599"/>
+              </a:lnSpc>
+            </a:pPr>
+            <a:r>
+              <a:rPr lang="hu-HU" sz="3999" dirty="0">
+                <a:solidFill>
+                  <a:srgbClr val="000000"/>
+                </a:solidFill>
+                <a:latin typeface="Roboto Medium" panose="02000000000000000000" pitchFamily="2" charset="0"/>
+                <a:ea typeface="Roboto Medium" panose="02000000000000000000" pitchFamily="2" charset="0"/>
+              </a:rPr>
+              <a:t>Lekérdezések</a:t>
+            </a:r>
+          </a:p>
+          <a:p>
+            <a:pPr marL="571500" indent="-571500">
+              <a:lnSpc>
+                <a:spcPts val="5599"/>
+              </a:lnSpc>
+              <a:buFont typeface="Arial" panose="020B0604020202020204" pitchFamily="34" charset="0"/>
+              <a:buChar char="•"/>
+            </a:pPr>
+            <a:r>
+              <a:rPr lang="hu-HU" sz="3999" dirty="0">
                 <a:solidFill>
                   <a:srgbClr val="000000"/>
                 </a:solidFill>
                 <a:latin typeface="Roboto Light" panose="02000000000000000000" pitchFamily="2" charset="0"/>
                 <a:ea typeface="Roboto Light" panose="02000000000000000000" pitchFamily="2" charset="0"/>
               </a:rPr>
-              <a:t>Adatbázis</a:t>
-            </a:r>
-            <a:r>
-              <a:rPr lang="hu-HU" sz="3600" dirty="0">
+              <a:t>13 db lekérdezés</a:t>
+            </a:r>
+          </a:p>
+          <a:p>
+            <a:pPr marL="571500" indent="-571500">
+              <a:lnSpc>
+                <a:spcPts val="5599"/>
+              </a:lnSpc>
+              <a:buFont typeface="Arial" panose="020B0604020202020204" pitchFamily="34" charset="0"/>
+              <a:buChar char="•"/>
+            </a:pPr>
+            <a:r>
+              <a:rPr lang="hu-HU" sz="3999" dirty="0">
                 <a:solidFill>
                   <a:srgbClr val="000000"/>
                 </a:solidFill>
                 <a:latin typeface="Roboto Light" panose="02000000000000000000" pitchFamily="2" charset="0"/>
                 <a:ea typeface="Roboto Light" panose="02000000000000000000" pitchFamily="2" charset="0"/>
               </a:rPr>
-              <a:t>: </a:t>
-            </a:r>
-            <a:r>
-              <a:rPr lang="hu-HU" sz="3600" dirty="0" err="1">
+              <a:t>2 adatbázison:</a:t>
+            </a:r>
+          </a:p>
+          <a:p>
+            <a:pPr marL="1028700" lvl="1" indent="-571500">
+              <a:lnSpc>
+                <a:spcPts val="5599"/>
+              </a:lnSpc>
+              <a:buFontTx/>
+              <a:buChar char="→"/>
+            </a:pPr>
+            <a:r>
+              <a:rPr lang="pt-BR" sz="3999" dirty="0">
                 <a:solidFill>
                   <a:srgbClr val="000000"/>
                 </a:solidFill>
                 <a:latin typeface="Roboto Light" panose="02000000000000000000" pitchFamily="2" charset="0"/>
                 <a:ea typeface="Roboto Light" panose="02000000000000000000" pitchFamily="2" charset="0"/>
               </a:rPr>
-              <a:t>Mnesia</a:t>
-            </a:r>
-            <a:endParaRPr lang="hu-HU" sz="3600" dirty="0">
-              <a:latin typeface="Roboto Light" panose="02000000000000000000" pitchFamily="2" charset="0"/>
-              <a:ea typeface="Roboto Light" panose="02000000000000000000" pitchFamily="2" charset="0"/>
-            </a:endParaRPr>
-          </a:p>
-        </p:txBody>
-      </p:sp>
-      <p:sp>
-        <p:nvSpPr>
-          <p:cNvPr id="20" name="Szövegdoboz 19">
-            <a:extLst>
-              <a:ext uri="{FF2B5EF4-FFF2-40B4-BE49-F238E27FC236}">
-                <a16:creationId xmlns:a16="http://schemas.microsoft.com/office/drawing/2014/main" id="{FA4EC41A-FD5B-4F99-978F-1F70684E880F}"/>
-              </a:ext>
-            </a:extLst>
-          </p:cNvPr>
-          <p:cNvSpPr txBox="1"/>
-          <p:nvPr/>
-        </p:nvSpPr>
-        <p:spPr>
-          <a:xfrm>
-            <a:off x="10770032" y="2048009"/>
-            <a:ext cx="6388287" cy="707886"/>
-          </a:xfrm>
-          <a:prstGeom prst="rect">
-            <a:avLst/>
-          </a:prstGeom>
-          <a:noFill/>
-        </p:spPr>
-        <p:txBody>
-          <a:bodyPr wrap="none" rtlCol="0">
-            <a:spAutoFit/>
-          </a:bodyPr>
-          <a:lstStyle/>
-          <a:p>
-            <a:r>
-              <a:rPr lang="hu-HU" sz="4000" dirty="0">
+              <a:t>94</a:t>
+            </a:r>
+            <a:r>
+              <a:rPr lang="hu-HU" sz="3999" dirty="0">
                 <a:solidFill>
                   <a:srgbClr val="000000"/>
                 </a:solidFill>
                 <a:latin typeface="Roboto Light" panose="02000000000000000000" pitchFamily="2" charset="0"/>
                 <a:ea typeface="Roboto Light" panose="02000000000000000000" pitchFamily="2" charset="0"/>
               </a:rPr>
-              <a:t>Adatbázis</a:t>
-            </a:r>
-            <a:r>
-              <a:rPr lang="hu-HU" sz="3600" dirty="0">
+              <a:t>,</a:t>
+            </a:r>
+            <a:r>
+              <a:rPr lang="pt-BR" sz="3999" dirty="0">
                 <a:solidFill>
                   <a:srgbClr val="000000"/>
                 </a:solidFill>
                 <a:latin typeface="Roboto Light" panose="02000000000000000000" pitchFamily="2" charset="0"/>
                 <a:ea typeface="Roboto Light" panose="02000000000000000000" pitchFamily="2" charset="0"/>
               </a:rPr>
-              <a:t>: </a:t>
-            </a:r>
-            <a:r>
-              <a:rPr lang="hu-HU" sz="3600" dirty="0" err="1">
+              <a:t>515 csúcs</a:t>
+            </a:r>
+            <a:r>
+              <a:rPr lang="en-US" sz="3999" dirty="0">
                 <a:solidFill>
                   <a:srgbClr val="000000"/>
                 </a:solidFill>
                 <a:latin typeface="Roboto Light" panose="02000000000000000000" pitchFamily="2" charset="0"/>
                 <a:ea typeface="Roboto Light" panose="02000000000000000000" pitchFamily="2" charset="0"/>
               </a:rPr>
-              <a:t>Mnesia</a:t>
-            </a:r>
-            <a:r>
-              <a:rPr lang="hu-HU" sz="3600" dirty="0">
+              <a:t> </a:t>
+            </a:r>
+            <a:r>
+              <a:rPr lang="en-US" sz="3999" dirty="0" err="1">
                 <a:solidFill>
                   <a:srgbClr val="000000"/>
                 </a:solidFill>
                 <a:latin typeface="Roboto Light" panose="02000000000000000000" pitchFamily="2" charset="0"/>
                 <a:ea typeface="Roboto Light" panose="02000000000000000000" pitchFamily="2" charset="0"/>
               </a:rPr>
-              <a:t>, SSH, </a:t>
-            </a:r>
-            <a:r>
-              <a:rPr lang="hu-HU" sz="3600" dirty="0" err="1">
+              <a:t>és</a:t>
+            </a:r>
+            <a:r>
+              <a:rPr lang="pt-BR" sz="3999" dirty="0">
                 <a:solidFill>
                   <a:srgbClr val="000000"/>
                 </a:solidFill>
                 <a:latin typeface="Roboto Light" panose="02000000000000000000" pitchFamily="2" charset="0"/>
                 <a:ea typeface="Roboto Light" panose="02000000000000000000" pitchFamily="2" charset="0"/>
               </a:rPr>
-              <a:t>Edoc</a:t>
-            </a:r>
-            <a:endParaRPr lang="hu-HU" sz="3600" dirty="0">
+              <a:t> 890</a:t>
+            </a:r>
+            <a:r>
+              <a:rPr lang="hu-HU" sz="3999" dirty="0">
+                <a:solidFill>
+                  <a:srgbClr val="000000"/>
+                </a:solidFill>
+                <a:latin typeface="Roboto Light" panose="02000000000000000000" pitchFamily="2" charset="0"/>
+                <a:ea typeface="Roboto Light" panose="02000000000000000000" pitchFamily="2" charset="0"/>
+              </a:rPr>
+              <a:t>,</a:t>
+            </a:r>
+            <a:r>
+              <a:rPr lang="pt-BR" sz="3999" dirty="0">
+                <a:solidFill>
+                  <a:srgbClr val="000000"/>
+                </a:solidFill>
+                <a:latin typeface="Roboto Light" panose="02000000000000000000" pitchFamily="2" charset="0"/>
+                <a:ea typeface="Roboto Light" panose="02000000000000000000" pitchFamily="2" charset="0"/>
+              </a:rPr>
+              <a:t>089 é</a:t>
+            </a:r>
+            <a:r>
+              <a:rPr lang="hu-HU" sz="3999" dirty="0">
+                <a:solidFill>
+                  <a:srgbClr val="000000"/>
+                </a:solidFill>
+                <a:latin typeface="Roboto Light" panose="02000000000000000000" pitchFamily="2" charset="0"/>
+                <a:ea typeface="Roboto Light" panose="02000000000000000000" pitchFamily="2" charset="0"/>
+              </a:rPr>
+              <a:t>l</a:t>
+            </a:r>
+            <a:endParaRPr lang="en-US" sz="3999" dirty="0">
+              <a:solidFill>
+                <a:srgbClr val="000000"/>
+              </a:solidFill>
               <a:latin typeface="Roboto Light" panose="02000000000000000000" pitchFamily="2" charset="0"/>
               <a:ea typeface="Roboto Light" panose="02000000000000000000" pitchFamily="2" charset="0"/>
             </a:endParaRPr>
           </a:p>
+          <a:p>
+            <a:pPr marL="1028700" lvl="1" indent="-571500">
+              <a:lnSpc>
+                <a:spcPts val="5599"/>
+              </a:lnSpc>
+              <a:buFontTx/>
+              <a:buChar char="→"/>
+            </a:pPr>
+            <a:r>
+              <a:rPr lang="hu-HU" sz="3999" dirty="0">
+                <a:solidFill>
+                  <a:srgbClr val="000000"/>
+                </a:solidFill>
+                <a:latin typeface="Roboto Light" panose="02000000000000000000" pitchFamily="2" charset="0"/>
+                <a:ea typeface="Roboto Light" panose="02000000000000000000" pitchFamily="2" charset="0"/>
+              </a:rPr>
+              <a:t>9</a:t>
+            </a:r>
+            <a:r>
+              <a:rPr lang="es-ES" sz="3999" dirty="0">
+                <a:solidFill>
+                  <a:srgbClr val="000000"/>
+                </a:solidFill>
+                <a:latin typeface="Roboto Light" panose="02000000000000000000" pitchFamily="2" charset="0"/>
+                <a:ea typeface="Roboto Light" panose="02000000000000000000" pitchFamily="2" charset="0"/>
+              </a:rPr>
+              <a:t>57,163 csúcs</a:t>
+            </a:r>
+            <a:r>
+              <a:rPr lang="en-US" sz="3999" dirty="0">
+                <a:solidFill>
+                  <a:srgbClr val="000000"/>
+                </a:solidFill>
+                <a:latin typeface="Roboto Light" panose="02000000000000000000" pitchFamily="2" charset="0"/>
+                <a:ea typeface="Roboto Light" panose="02000000000000000000" pitchFamily="2" charset="0"/>
+              </a:rPr>
+              <a:t> </a:t>
+            </a:r>
+            <a:r>
+              <a:rPr lang="en-US" sz="3999" dirty="0" err="1">
+                <a:solidFill>
+                  <a:srgbClr val="000000"/>
+                </a:solidFill>
+                <a:latin typeface="Roboto Light" panose="02000000000000000000" pitchFamily="2" charset="0"/>
+                <a:ea typeface="Roboto Light" panose="02000000000000000000" pitchFamily="2" charset="0"/>
+              </a:rPr>
+              <a:t>és</a:t>
+            </a:r>
+            <a:r>
+              <a:rPr lang="es-ES" sz="3999" dirty="0">
+                <a:solidFill>
+                  <a:srgbClr val="000000"/>
+                </a:solidFill>
+                <a:latin typeface="Roboto Light" panose="02000000000000000000" pitchFamily="2" charset="0"/>
+                <a:ea typeface="Roboto Light" panose="02000000000000000000" pitchFamily="2" charset="0"/>
+              </a:rPr>
+              <a:t> 2,110,396 él</a:t>
+            </a:r>
+            <a:endParaRPr lang="en-US" sz="3999" dirty="0">
+              <a:solidFill>
+                <a:srgbClr val="000000"/>
+              </a:solidFill>
+              <a:latin typeface="Roboto Light" panose="02000000000000000000" pitchFamily="2" charset="0"/>
+              <a:ea typeface="Roboto Light" panose="02000000000000000000" pitchFamily="2" charset="0"/>
+            </a:endParaRPr>
+          </a:p>
         </p:txBody>
       </p:sp>
-      <p:graphicFrame>
-        <p:nvGraphicFramePr>
-          <p:cNvPr id="21" name="Diagram 20">
+      <p:sp>
+        <p:nvSpPr>
+          <p:cNvPr id="18" name="Téglalap: lekerekített 17">
             <a:extLst>
               <a:ext uri="{FF2B5EF4-FFF2-40B4-BE49-F238E27FC236}">
-                <a16:creationId xmlns:a16="http://schemas.microsoft.com/office/drawing/2014/main" id="{7B34D913-EA12-4F1B-9C3D-DE82C5E2A2D8}"/>
+                <a16:creationId xmlns:a16="http://schemas.microsoft.com/office/drawing/2014/main" id="{74E6F5E2-F06C-470B-BF16-7C37F391EF6B}"/>
               </a:ext>
             </a:extLst>
           </p:cNvPr>
-          <p:cNvGraphicFramePr>
-            <a:graphicFrameLocks/>
-          </p:cNvGraphicFramePr>
-          <p:nvPr/>
-        </p:nvGraphicFramePr>
-        <p:xfrm>
-          <a:off x="482319" y="3147808"/>
-          <a:ext cx="8227446" cy="6883404"/>
-        </p:xfrm>
-        <a:graphic>
-          <a:graphicData uri="http://schemas.openxmlformats.org/drawingml/2006/chart">
-            <c:chart xmlns:c="http://schemas.openxmlformats.org/drawingml/2006/chart" xmlns:r="http://schemas.openxmlformats.org/officeDocument/2006/relationships" r:id="rId4"/>
-          </a:graphicData>
-        </a:graphic>
-      </p:graphicFrame>
-      <p:graphicFrame>
-        <p:nvGraphicFramePr>
-          <p:cNvPr id="22" name="Diagram 21">
-            <a:extLst>
-              <a:ext uri="{FF2B5EF4-FFF2-40B4-BE49-F238E27FC236}">
-                <a16:creationId xmlns:a16="http://schemas.microsoft.com/office/drawing/2014/main" id="{361B6CDD-DC82-4176-9E32-F2F4AB37C15C}"/>
-              </a:ext>
-            </a:extLst>
-          </p:cNvPr>
-          <p:cNvGraphicFramePr>
-            <a:graphicFrameLocks/>
-          </p:cNvGraphicFramePr>
-          <p:nvPr>
-            <p:extLst>
-              <p:ext uri="{D42A27DB-BD31-4B8C-83A1-F6EECF244321}">
-                <p14:modId xmlns:p14="http://schemas.microsoft.com/office/powerpoint/2010/main" val="2392701262"/>
-              </p:ext>
-            </p:extLst>
-          </p:nvPr>
-        </p:nvGraphicFramePr>
-        <p:xfrm>
-          <a:off x="9578237" y="3147808"/>
-          <a:ext cx="8227446" cy="6883404"/>
-        </p:xfrm>
-        <a:graphic>
-          <a:graphicData uri="http://schemas.openxmlformats.org/drawingml/2006/chart">
-            <c:chart xmlns:c="http://schemas.openxmlformats.org/drawingml/2006/chart" xmlns:r="http://schemas.openxmlformats.org/officeDocument/2006/relationships" r:id="rId5"/>
-          </a:graphicData>
-        </a:graphic>
-      </p:graphicFrame>
-      <p:sp>
-        <p:nvSpPr>
-          <p:cNvPr id="14" name="Szövegdoboz 13">
-            <a:extLst>
-              <a:ext uri="{FF2B5EF4-FFF2-40B4-BE49-F238E27FC236}">
-                <a16:creationId xmlns:a16="http://schemas.microsoft.com/office/drawing/2014/main" id="{95D9D29B-75F2-432A-A5B7-B549D57EB016}"/>
-              </a:ext>
-            </a:extLst>
-          </p:cNvPr>
-          <p:cNvSpPr txBox="1"/>
+          <p:cNvSpPr/>
           <p:nvPr/>
         </p:nvSpPr>
         <p:spPr>
           <a:xfrm>
-            <a:off x="11174430" y="2978531"/>
-            <a:ext cx="678391" cy="338554"/>
+            <a:off x="16230600" y="5753100"/>
+            <a:ext cx="1171350" cy="483352"/>
           </a:xfrm>
-          <a:prstGeom prst="rect">
+          <a:prstGeom prst="roundRect">
             <a:avLst/>
           </a:prstGeom>
           <a:noFill/>
+          <a:ln>
+            <a:solidFill>
+              <a:schemeClr val="accent3">
+                <a:lumMod val="75000"/>
+              </a:schemeClr>
+            </a:solidFill>
+          </a:ln>
         </p:spPr>
+        <p:style>
+          <a:lnRef idx="2">
+            <a:schemeClr val="accent1">
+              <a:shade val="50000"/>
+            </a:schemeClr>
+          </a:lnRef>
+          <a:fillRef idx="1">
+            <a:schemeClr val="accent1"/>
+          </a:fillRef>
+          <a:effectRef idx="0">
+            <a:schemeClr val="accent1"/>
+          </a:effectRef>
+          <a:fontRef idx="minor">
+            <a:schemeClr val="lt1"/>
+          </a:fontRef>
+        </p:style>
         <p:txBody>
-          <a:bodyPr wrap="none" rtlCol="0">
-            <a:spAutoFit/>
-          </a:bodyPr>
+          <a:bodyPr rtlCol="0" anchor="ctr"/>
           <a:lstStyle/>
           <a:p>
-            <a:r>
-              <a:rPr lang="en-US" sz="1600" dirty="0">
-                <a:latin typeface="Roboto Light" panose="02000000000000000000" pitchFamily="2" charset="0"/>
-                <a:ea typeface="Roboto Light" panose="02000000000000000000" pitchFamily="2" charset="0"/>
-              </a:rPr>
-              <a:t>291%</a:t>
-            </a:r>
-          </a:p>
-        </p:txBody>
-      </p:sp>
-      <p:sp>
-        <p:nvSpPr>
-          <p:cNvPr id="23" name="Szövegdoboz 22">
-            <a:extLst>
-              <a:ext uri="{FF2B5EF4-FFF2-40B4-BE49-F238E27FC236}">
-                <a16:creationId xmlns:a16="http://schemas.microsoft.com/office/drawing/2014/main" id="{B2E433BC-BE4B-41DE-B2E2-8B58A3C4A15B}"/>
-              </a:ext>
-            </a:extLst>
-          </p:cNvPr>
-          <p:cNvSpPr txBox="1"/>
-          <p:nvPr/>
-        </p:nvSpPr>
-        <p:spPr>
-          <a:xfrm>
-            <a:off x="12884194" y="2978531"/>
-            <a:ext cx="678391" cy="338554"/>
-          </a:xfrm>
-          <a:prstGeom prst="rect">
-            <a:avLst/>
-          </a:prstGeom>
-          <a:noFill/>
-        </p:spPr>
-        <p:txBody>
-          <a:bodyPr wrap="none" rtlCol="0">
-            <a:spAutoFit/>
-          </a:bodyPr>
-          <a:lstStyle/>
-          <a:p>
-            <a:r>
-              <a:rPr lang="en-US" sz="1600" dirty="0">
-                <a:latin typeface="Roboto Light" panose="02000000000000000000" pitchFamily="2" charset="0"/>
-                <a:ea typeface="Roboto Light" panose="02000000000000000000" pitchFamily="2" charset="0"/>
-              </a:rPr>
-              <a:t>240%</a:t>
-            </a:r>
+            <a:pPr algn="ctr"/>
+            <a:endParaRPr lang="hu-HU"/>
           </a:p>
         </p:txBody>
       </p:sp>
     </p:spTree>
     <p:extLst>
       <p:ext uri="{BB962C8B-B14F-4D97-AF65-F5344CB8AC3E}">
-        <p14:creationId xmlns:p14="http://schemas.microsoft.com/office/powerpoint/2010/main" val="360428399"/>
+        <p14:creationId xmlns:p14="http://schemas.microsoft.com/office/powerpoint/2010/main" val="1069095919"/>
       </p:ext>
     </p:extLst>
   </p:cSld>
@@ -16347,7 +16976,7 @@
         </p:nvGrpSpPr>
         <p:grpSpPr>
           <a:xfrm>
-            <a:off x="-152400" y="-987552"/>
+            <a:off x="-18143" y="328784"/>
             <a:ext cx="18288000" cy="12262103"/>
             <a:chOff x="0" y="0"/>
             <a:chExt cx="24384000" cy="16349470"/>
@@ -16843,7 +17472,7 @@
                 <a:latin typeface="Roboto Medium" panose="02000000000000000000" pitchFamily="2" charset="0"/>
                 <a:ea typeface="Roboto Medium" panose="02000000000000000000" pitchFamily="2" charset="0"/>
               </a:rPr>
-              <a:t>Helyesség</a:t>
+              <a:t>Eredmények</a:t>
             </a:r>
             <a:r>
               <a:rPr lang="en-US" sz="8000" dirty="0">
@@ -16863,7 +17492,7 @@
                 <a:latin typeface="Roboto Medium" panose="02000000000000000000" pitchFamily="2" charset="0"/>
                 <a:ea typeface="Roboto Medium" panose="02000000000000000000" pitchFamily="2" charset="0"/>
               </a:rPr>
-              <a:t>vizsgálata</a:t>
+              <a:t>kiértékelése</a:t>
             </a:r>
             <a:endParaRPr lang="en-US" sz="8000" dirty="0">
               <a:solidFill>
@@ -16877,203 +17506,10 @@
       </p:sp>
       <p:sp>
         <p:nvSpPr>
-          <p:cNvPr id="14" name="TextBox 14"/>
-          <p:cNvSpPr txBox="1"/>
-          <p:nvPr/>
-        </p:nvSpPr>
-        <p:spPr>
-          <a:xfrm>
-            <a:off x="1381659" y="3974086"/>
-            <a:ext cx="7076542" cy="2821285"/>
-          </a:xfrm>
-          <a:prstGeom prst="rect">
-            <a:avLst/>
-          </a:prstGeom>
-        </p:spPr>
-        <p:txBody>
-          <a:bodyPr wrap="square" lIns="0" tIns="0" rIns="0" bIns="0" rtlCol="0" anchor="t">
-            <a:spAutoFit/>
-          </a:bodyPr>
-          <a:lstStyle/>
-          <a:p>
-            <a:pPr>
-              <a:lnSpc>
-                <a:spcPts val="5599"/>
-              </a:lnSpc>
-            </a:pPr>
-            <a:r>
-              <a:rPr lang="hu-HU" sz="3999" dirty="0">
-                <a:solidFill>
-                  <a:srgbClr val="000000"/>
-                </a:solidFill>
-                <a:latin typeface="Roboto Light" panose="02000000000000000000" pitchFamily="2" charset="0"/>
-                <a:ea typeface="Roboto Light" panose="02000000000000000000" pitchFamily="2" charset="0"/>
-              </a:rPr>
-              <a:t>3 db </a:t>
-            </a:r>
-            <a:r>
-              <a:rPr lang="en-US" sz="3999" dirty="0" err="1">
-                <a:solidFill>
-                  <a:srgbClr val="000000"/>
-                </a:solidFill>
-                <a:latin typeface="Roboto Light" panose="02000000000000000000" pitchFamily="2" charset="0"/>
-                <a:ea typeface="Roboto Light" panose="02000000000000000000" pitchFamily="2" charset="0"/>
-              </a:rPr>
-              <a:t>RefactorErl</a:t>
-            </a:r>
-            <a:r>
-              <a:rPr lang="hu-HU" sz="3999" dirty="0">
-                <a:solidFill>
-                  <a:srgbClr val="000000"/>
-                </a:solidFill>
-                <a:latin typeface="Roboto Light" panose="02000000000000000000" pitchFamily="2" charset="0"/>
-                <a:ea typeface="Roboto Light" panose="02000000000000000000" pitchFamily="2" charset="0"/>
-              </a:rPr>
-              <a:t> példány:</a:t>
-            </a:r>
-          </a:p>
-          <a:p>
-            <a:pPr marL="1028700" lvl="1" indent="-571500">
-              <a:lnSpc>
-                <a:spcPts val="5599"/>
-              </a:lnSpc>
-              <a:buFont typeface="Arial" panose="020B0604020202020204" pitchFamily="34" charset="0"/>
-              <a:buChar char="•"/>
-            </a:pPr>
-            <a:r>
-              <a:rPr lang="hu-HU" sz="3999" dirty="0" err="1">
-                <a:solidFill>
-                  <a:srgbClr val="000000"/>
-                </a:solidFill>
-                <a:latin typeface="Roboto Light" panose="02000000000000000000" pitchFamily="2" charset="0"/>
-                <a:ea typeface="Roboto Light" panose="02000000000000000000" pitchFamily="2" charset="0"/>
-              </a:rPr>
-              <a:t>Mnesia</a:t>
-            </a:r>
-            <a:r>
-              <a:rPr lang="en-US" sz="3999" dirty="0">
-                <a:solidFill>
-                  <a:srgbClr val="000000"/>
-                </a:solidFill>
-                <a:latin typeface="Roboto Light" panose="02000000000000000000" pitchFamily="2" charset="0"/>
-                <a:ea typeface="Roboto Light" panose="02000000000000000000" pitchFamily="2" charset="0"/>
-              </a:rPr>
-              <a:t> DB</a:t>
-            </a:r>
-            <a:endParaRPr lang="hu-HU" sz="3999" dirty="0">
-              <a:solidFill>
-                <a:srgbClr val="000000"/>
-              </a:solidFill>
-              <a:latin typeface="Roboto Light" panose="02000000000000000000" pitchFamily="2" charset="0"/>
-              <a:ea typeface="Roboto Light" panose="02000000000000000000" pitchFamily="2" charset="0"/>
-            </a:endParaRPr>
-          </a:p>
-          <a:p>
-            <a:pPr marL="1028700" lvl="1" indent="-571500">
-              <a:lnSpc>
-                <a:spcPts val="5599"/>
-              </a:lnSpc>
-              <a:buFont typeface="Arial" panose="020B0604020202020204" pitchFamily="34" charset="0"/>
-              <a:buChar char="•"/>
-            </a:pPr>
-            <a:r>
-              <a:rPr lang="hu-HU" sz="3999" dirty="0">
-                <a:solidFill>
-                  <a:srgbClr val="000000"/>
-                </a:solidFill>
-                <a:latin typeface="Roboto Light" panose="02000000000000000000" pitchFamily="2" charset="0"/>
-                <a:ea typeface="Roboto Light" panose="02000000000000000000" pitchFamily="2" charset="0"/>
-              </a:rPr>
-              <a:t>Map</a:t>
-            </a:r>
-            <a:r>
-              <a:rPr lang="en-US" sz="3999" dirty="0">
-                <a:solidFill>
-                  <a:srgbClr val="000000"/>
-                </a:solidFill>
-                <a:latin typeface="Roboto Light" panose="02000000000000000000" pitchFamily="2" charset="0"/>
-                <a:ea typeface="Roboto Light" panose="02000000000000000000" pitchFamily="2" charset="0"/>
-              </a:rPr>
-              <a:t> DB</a:t>
-            </a:r>
-            <a:endParaRPr lang="hu-HU" sz="3999" dirty="0">
-              <a:solidFill>
-                <a:srgbClr val="000000"/>
-              </a:solidFill>
-              <a:latin typeface="Roboto Light" panose="02000000000000000000" pitchFamily="2" charset="0"/>
-              <a:ea typeface="Roboto Light" panose="02000000000000000000" pitchFamily="2" charset="0"/>
-            </a:endParaRPr>
-          </a:p>
-          <a:p>
-            <a:pPr marL="1028700" lvl="1" indent="-571500">
-              <a:lnSpc>
-                <a:spcPts val="5599"/>
-              </a:lnSpc>
-              <a:buFont typeface="Arial" panose="020B0604020202020204" pitchFamily="34" charset="0"/>
-              <a:buChar char="•"/>
-            </a:pPr>
-            <a:r>
-              <a:rPr lang="hu-HU" sz="3999" dirty="0">
-                <a:solidFill>
-                  <a:srgbClr val="000000"/>
-                </a:solidFill>
-                <a:latin typeface="Roboto Light" panose="02000000000000000000" pitchFamily="2" charset="0"/>
-                <a:ea typeface="Roboto Light" panose="02000000000000000000" pitchFamily="2" charset="0"/>
-              </a:rPr>
-              <a:t>Teszt</a:t>
-            </a:r>
-            <a:endParaRPr lang="en-US" sz="3999" dirty="0">
-              <a:solidFill>
-                <a:srgbClr val="000000"/>
-              </a:solidFill>
-              <a:latin typeface="Roboto Light" panose="02000000000000000000" pitchFamily="2" charset="0"/>
-              <a:ea typeface="Roboto Light" panose="02000000000000000000" pitchFamily="2" charset="0"/>
-            </a:endParaRPr>
-          </a:p>
-        </p:txBody>
-      </p:sp>
-      <p:pic>
-        <p:nvPicPr>
-          <p:cNvPr id="16" name="Kép 15">
-            <a:extLst>
-              <a:ext uri="{FF2B5EF4-FFF2-40B4-BE49-F238E27FC236}">
-                <a16:creationId xmlns:a16="http://schemas.microsoft.com/office/drawing/2014/main" id="{81937759-E602-41F4-A80A-14CFCD5AB0EE}"/>
-              </a:ext>
-            </a:extLst>
-          </p:cNvPr>
-          <p:cNvPicPr>
-            <a:picLocks noChangeAspect="1"/>
-          </p:cNvPicPr>
-          <p:nvPr/>
-        </p:nvPicPr>
-        <p:blipFill>
-          <a:blip r:embed="rId4">
-            <a:extLst>
-              <a:ext uri="{28A0092B-C50C-407E-A947-70E740481C1C}">
-                <a14:useLocalDpi xmlns:a14="http://schemas.microsoft.com/office/drawing/2010/main" val="0"/>
-              </a:ext>
-            </a:extLst>
-          </a:blip>
-          <a:stretch>
-            <a:fillRect/>
-          </a:stretch>
-        </p:blipFill>
-        <p:spPr>
-          <a:xfrm>
-            <a:off x="8775638" y="2688091"/>
-            <a:ext cx="8130703" cy="6148844"/>
-          </a:xfrm>
-          <a:prstGeom prst="rect">
-            <a:avLst/>
-          </a:prstGeom>
-        </p:spPr>
-      </p:pic>
-      <p:sp>
-        <p:nvSpPr>
           <p:cNvPr id="15" name="Szövegdoboz 14">
             <a:extLst>
               <a:ext uri="{FF2B5EF4-FFF2-40B4-BE49-F238E27FC236}">
-                <a16:creationId xmlns:a16="http://schemas.microsoft.com/office/drawing/2014/main" id="{01F98474-DDC4-4692-B4B1-A9178FF94A59}"/>
+                <a16:creationId xmlns:a16="http://schemas.microsoft.com/office/drawing/2014/main" id="{4EDCD450-E991-4880-AE61-B3FB156CC9C4}"/>
               </a:ext>
             </a:extLst>
           </p:cNvPr>
@@ -17082,8 +17518,8 @@
         </p:nvSpPr>
         <p:spPr>
           <a:xfrm>
-            <a:off x="3834269" y="6599868"/>
-            <a:ext cx="990600" cy="369332"/>
+            <a:off x="3180577" y="2048009"/>
+            <a:ext cx="4237057" cy="707886"/>
           </a:xfrm>
           <a:prstGeom prst="rect">
             <a:avLst/>
@@ -17091,31 +17527,267 @@
           <a:noFill/>
         </p:spPr>
         <p:txBody>
-          <a:bodyPr wrap="square" rtlCol="0">
+          <a:bodyPr wrap="none" rtlCol="0">
             <a:spAutoFit/>
           </a:bodyPr>
           <a:lstStyle/>
           <a:p>
-            <a:pPr marL="285750" indent="-285750">
-              <a:buClr>
-                <a:srgbClr val="00B050"/>
-              </a:buClr>
-              <a:buSzPct val="400000"/>
-              <a:buFont typeface="Wingdings" panose="05000000000000000000" pitchFamily="2" charset="2"/>
-              <a:buChar char="ü"/>
-            </a:pPr>
-            <a:r>
-              <a:rPr lang="en-US" dirty="0"/>
-              <a:t> </a:t>
-            </a:r>
-            <a:endParaRPr lang="hu-HU" dirty="0"/>
+            <a:r>
+              <a:rPr lang="hu-HU" sz="4000" dirty="0">
+                <a:solidFill>
+                  <a:srgbClr val="000000"/>
+                </a:solidFill>
+                <a:latin typeface="Roboto Light" panose="02000000000000000000" pitchFamily="2" charset="0"/>
+                <a:ea typeface="Roboto Light" panose="02000000000000000000" pitchFamily="2" charset="0"/>
+              </a:rPr>
+              <a:t>Adatbázis</a:t>
+            </a:r>
+            <a:r>
+              <a:rPr lang="hu-HU" sz="3600" dirty="0">
+                <a:solidFill>
+                  <a:srgbClr val="000000"/>
+                </a:solidFill>
+                <a:latin typeface="Roboto Light" panose="02000000000000000000" pitchFamily="2" charset="0"/>
+                <a:ea typeface="Roboto Light" panose="02000000000000000000" pitchFamily="2" charset="0"/>
+              </a:rPr>
+              <a:t>: </a:t>
+            </a:r>
+            <a:r>
+              <a:rPr lang="hu-HU" sz="3600" dirty="0" err="1">
+                <a:solidFill>
+                  <a:srgbClr val="000000"/>
+                </a:solidFill>
+                <a:latin typeface="Roboto Light" panose="02000000000000000000" pitchFamily="2" charset="0"/>
+                <a:ea typeface="Roboto Light" panose="02000000000000000000" pitchFamily="2" charset="0"/>
+              </a:rPr>
+              <a:t>Mnesia</a:t>
+            </a:r>
+            <a:endParaRPr lang="hu-HU" sz="3600" dirty="0">
+              <a:latin typeface="Roboto Light" panose="02000000000000000000" pitchFamily="2" charset="0"/>
+              <a:ea typeface="Roboto Light" panose="02000000000000000000" pitchFamily="2" charset="0"/>
+            </a:endParaRPr>
+          </a:p>
+        </p:txBody>
+      </p:sp>
+      <p:sp>
+        <p:nvSpPr>
+          <p:cNvPr id="20" name="Szövegdoboz 19">
+            <a:extLst>
+              <a:ext uri="{FF2B5EF4-FFF2-40B4-BE49-F238E27FC236}">
+                <a16:creationId xmlns:a16="http://schemas.microsoft.com/office/drawing/2014/main" id="{FA4EC41A-FD5B-4F99-978F-1F70684E880F}"/>
+              </a:ext>
+            </a:extLst>
+          </p:cNvPr>
+          <p:cNvSpPr txBox="1"/>
+          <p:nvPr/>
+        </p:nvSpPr>
+        <p:spPr>
+          <a:xfrm>
+            <a:off x="10770032" y="2048009"/>
+            <a:ext cx="6388287" cy="707886"/>
+          </a:xfrm>
+          <a:prstGeom prst="rect">
+            <a:avLst/>
+          </a:prstGeom>
+          <a:noFill/>
+        </p:spPr>
+        <p:txBody>
+          <a:bodyPr wrap="none" rtlCol="0">
+            <a:spAutoFit/>
+          </a:bodyPr>
+          <a:lstStyle/>
+          <a:p>
+            <a:r>
+              <a:rPr lang="hu-HU" sz="4000" dirty="0">
+                <a:solidFill>
+                  <a:srgbClr val="000000"/>
+                </a:solidFill>
+                <a:latin typeface="Roboto Light" panose="02000000000000000000" pitchFamily="2" charset="0"/>
+                <a:ea typeface="Roboto Light" panose="02000000000000000000" pitchFamily="2" charset="0"/>
+              </a:rPr>
+              <a:t>Adatbázis</a:t>
+            </a:r>
+            <a:r>
+              <a:rPr lang="hu-HU" sz="3600" dirty="0">
+                <a:solidFill>
+                  <a:srgbClr val="000000"/>
+                </a:solidFill>
+                <a:latin typeface="Roboto Light" panose="02000000000000000000" pitchFamily="2" charset="0"/>
+                <a:ea typeface="Roboto Light" panose="02000000000000000000" pitchFamily="2" charset="0"/>
+              </a:rPr>
+              <a:t>: </a:t>
+            </a:r>
+            <a:r>
+              <a:rPr lang="hu-HU" sz="3600" dirty="0" err="1">
+                <a:solidFill>
+                  <a:srgbClr val="000000"/>
+                </a:solidFill>
+                <a:latin typeface="Roboto Light" panose="02000000000000000000" pitchFamily="2" charset="0"/>
+                <a:ea typeface="Roboto Light" panose="02000000000000000000" pitchFamily="2" charset="0"/>
+              </a:rPr>
+              <a:t>Mnesia</a:t>
+            </a:r>
+            <a:r>
+              <a:rPr lang="hu-HU" sz="3600" dirty="0">
+                <a:solidFill>
+                  <a:srgbClr val="000000"/>
+                </a:solidFill>
+                <a:latin typeface="Roboto Light" panose="02000000000000000000" pitchFamily="2" charset="0"/>
+                <a:ea typeface="Roboto Light" panose="02000000000000000000" pitchFamily="2" charset="0"/>
+              </a:rPr>
+              <a:t>, SSH, </a:t>
+            </a:r>
+            <a:r>
+              <a:rPr lang="hu-HU" sz="3600" dirty="0" err="1">
+                <a:solidFill>
+                  <a:srgbClr val="000000"/>
+                </a:solidFill>
+                <a:latin typeface="Roboto Light" panose="02000000000000000000" pitchFamily="2" charset="0"/>
+                <a:ea typeface="Roboto Light" panose="02000000000000000000" pitchFamily="2" charset="0"/>
+              </a:rPr>
+              <a:t>Edoc</a:t>
+            </a:r>
+            <a:endParaRPr lang="hu-HU" sz="3600" dirty="0">
+              <a:latin typeface="Roboto Light" panose="02000000000000000000" pitchFamily="2" charset="0"/>
+              <a:ea typeface="Roboto Light" panose="02000000000000000000" pitchFamily="2" charset="0"/>
+            </a:endParaRPr>
+          </a:p>
+        </p:txBody>
+      </p:sp>
+      <p:graphicFrame>
+        <p:nvGraphicFramePr>
+          <p:cNvPr id="21" name="Diagram 20">
+            <a:extLst>
+              <a:ext uri="{FF2B5EF4-FFF2-40B4-BE49-F238E27FC236}">
+                <a16:creationId xmlns:a16="http://schemas.microsoft.com/office/drawing/2014/main" id="{7B34D913-EA12-4F1B-9C3D-DE82C5E2A2D8}"/>
+              </a:ext>
+            </a:extLst>
+          </p:cNvPr>
+          <p:cNvGraphicFramePr>
+            <a:graphicFrameLocks/>
+          </p:cNvGraphicFramePr>
+          <p:nvPr/>
+        </p:nvGraphicFramePr>
+        <p:xfrm>
+          <a:off x="482319" y="3147808"/>
+          <a:ext cx="8227446" cy="6883404"/>
+        </p:xfrm>
+        <a:graphic>
+          <a:graphicData uri="http://schemas.openxmlformats.org/drawingml/2006/chart">
+            <c:chart xmlns:c="http://schemas.openxmlformats.org/drawingml/2006/chart" xmlns:r="http://schemas.openxmlformats.org/officeDocument/2006/relationships" r:id="rId4"/>
+          </a:graphicData>
+        </a:graphic>
+      </p:graphicFrame>
+      <p:graphicFrame>
+        <p:nvGraphicFramePr>
+          <p:cNvPr id="22" name="Diagram 21">
+            <a:extLst>
+              <a:ext uri="{FF2B5EF4-FFF2-40B4-BE49-F238E27FC236}">
+                <a16:creationId xmlns:a16="http://schemas.microsoft.com/office/drawing/2014/main" id="{361B6CDD-DC82-4176-9E32-F2F4AB37C15C}"/>
+              </a:ext>
+            </a:extLst>
+          </p:cNvPr>
+          <p:cNvGraphicFramePr>
+            <a:graphicFrameLocks/>
+          </p:cNvGraphicFramePr>
+          <p:nvPr>
+            <p:extLst>
+              <p:ext uri="{D42A27DB-BD31-4B8C-83A1-F6EECF244321}">
+                <p14:modId xmlns:p14="http://schemas.microsoft.com/office/powerpoint/2010/main" val="2392701262"/>
+              </p:ext>
+            </p:extLst>
+          </p:nvPr>
+        </p:nvGraphicFramePr>
+        <p:xfrm>
+          <a:off x="9578237" y="3147808"/>
+          <a:ext cx="8227446" cy="6883404"/>
+        </p:xfrm>
+        <a:graphic>
+          <a:graphicData uri="http://schemas.openxmlformats.org/drawingml/2006/chart">
+            <c:chart xmlns:c="http://schemas.openxmlformats.org/drawingml/2006/chart" xmlns:r="http://schemas.openxmlformats.org/officeDocument/2006/relationships" r:id="rId5"/>
+          </a:graphicData>
+        </a:graphic>
+      </p:graphicFrame>
+      <p:sp>
+        <p:nvSpPr>
+          <p:cNvPr id="14" name="Szövegdoboz 13">
+            <a:extLst>
+              <a:ext uri="{FF2B5EF4-FFF2-40B4-BE49-F238E27FC236}">
+                <a16:creationId xmlns:a16="http://schemas.microsoft.com/office/drawing/2014/main" id="{95D9D29B-75F2-432A-A5B7-B549D57EB016}"/>
+              </a:ext>
+            </a:extLst>
+          </p:cNvPr>
+          <p:cNvSpPr txBox="1"/>
+          <p:nvPr/>
+        </p:nvSpPr>
+        <p:spPr>
+          <a:xfrm>
+            <a:off x="11174430" y="2978531"/>
+            <a:ext cx="678391" cy="338554"/>
+          </a:xfrm>
+          <a:prstGeom prst="rect">
+            <a:avLst/>
+          </a:prstGeom>
+          <a:noFill/>
+        </p:spPr>
+        <p:txBody>
+          <a:bodyPr wrap="none" rtlCol="0">
+            <a:spAutoFit/>
+          </a:bodyPr>
+          <a:lstStyle/>
+          <a:p>
+            <a:r>
+              <a:rPr lang="en-US" sz="1600" dirty="0">
+                <a:latin typeface="Roboto Light" panose="02000000000000000000" pitchFamily="2" charset="0"/>
+                <a:ea typeface="Roboto Light" panose="02000000000000000000" pitchFamily="2" charset="0"/>
+              </a:rPr>
+              <a:t>291%</a:t>
+            </a:r>
+          </a:p>
+        </p:txBody>
+      </p:sp>
+      <p:sp>
+        <p:nvSpPr>
+          <p:cNvPr id="23" name="Szövegdoboz 22">
+            <a:extLst>
+              <a:ext uri="{FF2B5EF4-FFF2-40B4-BE49-F238E27FC236}">
+                <a16:creationId xmlns:a16="http://schemas.microsoft.com/office/drawing/2014/main" id="{B2E433BC-BE4B-41DE-B2E2-8B58A3C4A15B}"/>
+              </a:ext>
+            </a:extLst>
+          </p:cNvPr>
+          <p:cNvSpPr txBox="1"/>
+          <p:nvPr/>
+        </p:nvSpPr>
+        <p:spPr>
+          <a:xfrm>
+            <a:off x="12884194" y="2978531"/>
+            <a:ext cx="678391" cy="338554"/>
+          </a:xfrm>
+          <a:prstGeom prst="rect">
+            <a:avLst/>
+          </a:prstGeom>
+          <a:noFill/>
+        </p:spPr>
+        <p:txBody>
+          <a:bodyPr wrap="none" rtlCol="0">
+            <a:spAutoFit/>
+          </a:bodyPr>
+          <a:lstStyle/>
+          <a:p>
+            <a:r>
+              <a:rPr lang="en-US" sz="1600" dirty="0">
+                <a:latin typeface="Roboto Light" panose="02000000000000000000" pitchFamily="2" charset="0"/>
+                <a:ea typeface="Roboto Light" panose="02000000000000000000" pitchFamily="2" charset="0"/>
+              </a:rPr>
+              <a:t>240%</a:t>
+            </a:r>
           </a:p>
         </p:txBody>
       </p:sp>
     </p:spTree>
     <p:extLst>
       <p:ext uri="{BB962C8B-B14F-4D97-AF65-F5344CB8AC3E}">
-        <p14:creationId xmlns:p14="http://schemas.microsoft.com/office/powerpoint/2010/main" val="1666384148"/>
+        <p14:creationId xmlns:p14="http://schemas.microsoft.com/office/powerpoint/2010/main" val="360428399"/>
       </p:ext>
     </p:extLst>
   </p:cSld>

</xml_diff>